<commit_message>
PPT with portfolio table
</commit_message>
<xml_diff>
--- a/Project 1 presentation.pptx
+++ b/Project 1 presentation.pptx
@@ -5,34 +5,35 @@
     <p:sldMasterId id="2147483648" r:id="rId4"/>
   </p:sldMasterIdLst>
   <p:notesMasterIdLst>
-    <p:notesMasterId r:id="rId27"/>
+    <p:notesMasterId r:id="rId28"/>
   </p:notesMasterIdLst>
   <p:handoutMasterIdLst>
-    <p:handoutMasterId r:id="rId28"/>
+    <p:handoutMasterId r:id="rId29"/>
   </p:handoutMasterIdLst>
   <p:sldIdLst>
     <p:sldId id="256" r:id="rId5"/>
     <p:sldId id="2434" r:id="rId6"/>
-    <p:sldId id="2444" r:id="rId7"/>
-    <p:sldId id="2450" r:id="rId8"/>
+    <p:sldId id="2450" r:id="rId7"/>
+    <p:sldId id="2444" r:id="rId8"/>
     <p:sldId id="2452" r:id="rId9"/>
     <p:sldId id="2445" r:id="rId10"/>
-    <p:sldId id="2446" r:id="rId11"/>
-    <p:sldId id="2447" r:id="rId12"/>
-    <p:sldId id="2448" r:id="rId13"/>
-    <p:sldId id="2449" r:id="rId14"/>
-    <p:sldId id="2454" r:id="rId15"/>
-    <p:sldId id="2451" r:id="rId16"/>
-    <p:sldId id="2439" r:id="rId17"/>
-    <p:sldId id="2440" r:id="rId18"/>
-    <p:sldId id="260" r:id="rId19"/>
-    <p:sldId id="2453" r:id="rId20"/>
-    <p:sldId id="258" r:id="rId21"/>
-    <p:sldId id="2432" r:id="rId22"/>
-    <p:sldId id="2433" r:id="rId23"/>
-    <p:sldId id="2438" r:id="rId24"/>
-    <p:sldId id="2441" r:id="rId25"/>
-    <p:sldId id="2442" r:id="rId26"/>
+    <p:sldId id="2455" r:id="rId11"/>
+    <p:sldId id="2446" r:id="rId12"/>
+    <p:sldId id="2447" r:id="rId13"/>
+    <p:sldId id="2448" r:id="rId14"/>
+    <p:sldId id="2449" r:id="rId15"/>
+    <p:sldId id="2454" r:id="rId16"/>
+    <p:sldId id="2451" r:id="rId17"/>
+    <p:sldId id="2439" r:id="rId18"/>
+    <p:sldId id="2440" r:id="rId19"/>
+    <p:sldId id="260" r:id="rId20"/>
+    <p:sldId id="2453" r:id="rId21"/>
+    <p:sldId id="258" r:id="rId22"/>
+    <p:sldId id="2432" r:id="rId23"/>
+    <p:sldId id="2433" r:id="rId24"/>
+    <p:sldId id="2438" r:id="rId25"/>
+    <p:sldId id="2441" r:id="rId26"/>
+    <p:sldId id="2442" r:id="rId27"/>
   </p:sldIdLst>
   <p:sldSz cx="12192000" cy="6858000"/>
   <p:notesSz cx="6858000" cy="9144000"/>
@@ -1367,7 +1368,7 @@
           <a:p>
             <a:fld id="{D1CB9CF0-A540-4793-A5F3-F4917CFDDCB6}" type="datetimeFigureOut">
               <a:rPr lang="en-US" smtClean="0"/>
-              <a:t>2/9/2022</a:t>
+              <a:t>2/11/2022</a:t>
             </a:fld>
             <a:endParaRPr lang="en-US" dirty="0"/>
           </a:p>
@@ -1544,7 +1545,7 @@
           <a:p>
             <a:fld id="{EDA03753-A5BE-4D79-AEA9-C0A65A6F8851}" type="datetimeFigureOut">
               <a:rPr lang="en-US" smtClean="0"/>
-              <a:t>2/9/2022</a:t>
+              <a:t>2/11/2022</a:t>
             </a:fld>
             <a:endParaRPr lang="en-US" dirty="0"/>
           </a:p>
@@ -17609,7 +17610,7 @@
           <a:p>
             <a:r>
               <a:rPr lang="en-US" dirty="0"/>
-              <a:t>SAMPLE Data</a:t>
+              <a:t>Sample Data</a:t>
             </a:r>
           </a:p>
         </p:txBody>
@@ -17698,6 +17699,178 @@
           </a:p>
         </p:txBody>
       </p:sp>
+      <p:pic>
+        <p:nvPicPr>
+          <p:cNvPr id="6" name="Picture 5">
+            <a:extLst>
+              <a:ext uri="{FF2B5EF4-FFF2-40B4-BE49-F238E27FC236}">
+                <a16:creationId xmlns:a16="http://schemas.microsoft.com/office/drawing/2014/main" id="{D753ADF3-3991-497D-BFFF-B814207A6099}"/>
+              </a:ext>
+            </a:extLst>
+          </p:cNvPr>
+          <p:cNvPicPr>
+            <a:picLocks noChangeAspect="1"/>
+          </p:cNvPicPr>
+          <p:nvPr/>
+        </p:nvPicPr>
+        <p:blipFill>
+          <a:blip r:embed="rId2"/>
+          <a:stretch>
+            <a:fillRect/>
+          </a:stretch>
+        </p:blipFill>
+        <p:spPr>
+          <a:xfrm>
+            <a:off x="109845" y="61073"/>
+            <a:ext cx="969348" cy="1066892"/>
+          </a:xfrm>
+          <a:prstGeom prst="rect">
+            <a:avLst/>
+          </a:prstGeom>
+        </p:spPr>
+      </p:pic>
+    </p:spTree>
+    <p:extLst>
+      <p:ext uri="{BB962C8B-B14F-4D97-AF65-F5344CB8AC3E}">
+        <p14:creationId xmlns:p14="http://schemas.microsoft.com/office/powerpoint/2010/main" val="3305955585"/>
+      </p:ext>
+    </p:extLst>
+  </p:cSld>
+  <p:clrMapOvr>
+    <a:masterClrMapping/>
+  </p:clrMapOvr>
+</p:sld>
+</file>
+
+<file path=ppt/slides/slide11.xml><?xml version="1.0" encoding="utf-8"?>
+<p:sld xmlns:a="http://schemas.openxmlformats.org/drawingml/2006/main" xmlns:r="http://schemas.openxmlformats.org/officeDocument/2006/relationships" xmlns:p="http://schemas.openxmlformats.org/presentationml/2006/main">
+  <p:cSld>
+    <p:spTree>
+      <p:nvGrpSpPr>
+        <p:cNvPr id="1" name=""/>
+        <p:cNvGrpSpPr/>
+        <p:nvPr/>
+      </p:nvGrpSpPr>
+      <p:grpSpPr>
+        <a:xfrm>
+          <a:off x="0" y="0"/>
+          <a:ext cx="0" cy="0"/>
+          <a:chOff x="0" y="0"/>
+          <a:chExt cx="0" cy="0"/>
+        </a:xfrm>
+      </p:grpSpPr>
+      <p:sp>
+        <p:nvSpPr>
+          <p:cNvPr id="2" name="Title 1">
+            <a:extLst>
+              <a:ext uri="{FF2B5EF4-FFF2-40B4-BE49-F238E27FC236}">
+                <a16:creationId xmlns:a16="http://schemas.microsoft.com/office/drawing/2014/main" id="{8F1D5BE7-C36F-4E21-A63C-E9B442D1114F}"/>
+              </a:ext>
+            </a:extLst>
+          </p:cNvPr>
+          <p:cNvSpPr>
+            <a:spLocks noGrp="1"/>
+          </p:cNvSpPr>
+          <p:nvPr>
+            <p:ph type="title"/>
+          </p:nvPr>
+        </p:nvSpPr>
+        <p:spPr/>
+        <p:txBody>
+          <a:bodyPr/>
+          <a:lstStyle/>
+          <a:p>
+            <a:r>
+              <a:rPr lang="en-US" dirty="0"/>
+              <a:t>SAMPLE Data</a:t>
+            </a:r>
+          </a:p>
+        </p:txBody>
+      </p:sp>
+      <p:sp>
+        <p:nvSpPr>
+          <p:cNvPr id="3" name="Footer Placeholder 2">
+            <a:extLst>
+              <a:ext uri="{FF2B5EF4-FFF2-40B4-BE49-F238E27FC236}">
+                <a16:creationId xmlns:a16="http://schemas.microsoft.com/office/drawing/2014/main" id="{B7C20DAC-9DB6-4515-971B-9D850CF7815D}"/>
+              </a:ext>
+            </a:extLst>
+          </p:cNvPr>
+          <p:cNvSpPr>
+            <a:spLocks noGrp="1"/>
+          </p:cNvSpPr>
+          <p:nvPr>
+            <p:ph type="ftr" sz="quarter" idx="10"/>
+          </p:nvPr>
+        </p:nvSpPr>
+        <p:spPr/>
+        <p:txBody>
+          <a:bodyPr/>
+          <a:lstStyle/>
+          <a:p>
+            <a:r>
+              <a:rPr lang="en-US"/>
+              <a:t>Add a Footer</a:t>
+            </a:r>
+            <a:endParaRPr lang="en-US" dirty="0"/>
+          </a:p>
+        </p:txBody>
+      </p:sp>
+      <p:sp>
+        <p:nvSpPr>
+          <p:cNvPr id="4" name="Slide Number Placeholder 3">
+            <a:extLst>
+              <a:ext uri="{FF2B5EF4-FFF2-40B4-BE49-F238E27FC236}">
+                <a16:creationId xmlns:a16="http://schemas.microsoft.com/office/drawing/2014/main" id="{C94957B4-5AE9-4220-87B6-BBB66AC0E59C}"/>
+              </a:ext>
+            </a:extLst>
+          </p:cNvPr>
+          <p:cNvSpPr>
+            <a:spLocks noGrp="1"/>
+          </p:cNvSpPr>
+          <p:nvPr>
+            <p:ph type="sldNum" sz="quarter" idx="11"/>
+          </p:nvPr>
+        </p:nvSpPr>
+        <p:spPr/>
+        <p:txBody>
+          <a:bodyPr/>
+          <a:lstStyle/>
+          <a:p>
+            <a:fld id="{8C2E478F-E849-4A8C-AF1F-CBCC78A7CBFA}" type="slidenum">
+              <a:rPr lang="en-US" smtClean="0"/>
+              <a:pPr/>
+              <a:t>11</a:t>
+            </a:fld>
+            <a:endParaRPr lang="en-US" dirty="0"/>
+          </a:p>
+        </p:txBody>
+      </p:sp>
+      <p:sp>
+        <p:nvSpPr>
+          <p:cNvPr id="5" name="Content Placeholder 4">
+            <a:extLst>
+              <a:ext uri="{FF2B5EF4-FFF2-40B4-BE49-F238E27FC236}">
+                <a16:creationId xmlns:a16="http://schemas.microsoft.com/office/drawing/2014/main" id="{E742D916-2B17-43E6-8709-D29220B8204C}"/>
+              </a:ext>
+            </a:extLst>
+          </p:cNvPr>
+          <p:cNvSpPr>
+            <a:spLocks noGrp="1"/>
+          </p:cNvSpPr>
+          <p:nvPr>
+            <p:ph idx="1"/>
+          </p:nvPr>
+        </p:nvSpPr>
+        <p:spPr/>
+        <p:txBody>
+          <a:bodyPr/>
+          <a:lstStyle/>
+          <a:p>
+            <a:endParaRPr lang="en-US"/>
+          </a:p>
+        </p:txBody>
+      </p:sp>
     </p:spTree>
     <p:extLst>
       <p:ext uri="{BB962C8B-B14F-4D97-AF65-F5344CB8AC3E}">
@@ -17711,7 +17884,7 @@
 </p:sld>
 </file>
 
-<file path=ppt/slides/slide11.xml><?xml version="1.0" encoding="utf-8"?>
+<file path=ppt/slides/slide12.xml><?xml version="1.0" encoding="utf-8"?>
 <p:sld xmlns:a="http://schemas.openxmlformats.org/drawingml/2006/main" xmlns:r="http://schemas.openxmlformats.org/officeDocument/2006/relationships" xmlns:p="http://schemas.openxmlformats.org/presentationml/2006/main">
   <p:cSld>
     <p:spTree>
@@ -17752,7 +17925,7 @@
             <a:fld id="{8C2E478F-E849-4A8C-AF1F-CBCC78A7CBFA}" type="slidenum">
               <a:rPr lang="en-US" smtClean="0"/>
               <a:pPr/>
-              <a:t>11</a:t>
+              <a:t>12</a:t>
             </a:fld>
             <a:endParaRPr lang="en-US" dirty="0"/>
           </a:p>
@@ -17889,7 +18062,7 @@
 </p:sld>
 </file>
 
-<file path=ppt/slides/slide12.xml><?xml version="1.0" encoding="utf-8"?>
+<file path=ppt/slides/slide13.xml><?xml version="1.0" encoding="utf-8"?>
 <p:sld xmlns:a="http://schemas.openxmlformats.org/drawingml/2006/main" xmlns:r="http://schemas.openxmlformats.org/officeDocument/2006/relationships" xmlns:p="http://schemas.openxmlformats.org/presentationml/2006/main">
   <p:cSld>
     <p:spTree>
@@ -17987,7 +18160,7 @@
             <a:fld id="{8C2E478F-E849-4A8C-AF1F-CBCC78A7CBFA}" type="slidenum">
               <a:rPr lang="en-US" smtClean="0"/>
               <a:pPr/>
-              <a:t>12</a:t>
+              <a:t>13</a:t>
             </a:fld>
             <a:endParaRPr lang="en-US" dirty="0"/>
           </a:p>
@@ -18031,7 +18204,7 @@
 </p:sld>
 </file>
 
-<file path=ppt/slides/slide13.xml><?xml version="1.0" encoding="utf-8"?>
+<file path=ppt/slides/slide14.xml><?xml version="1.0" encoding="utf-8"?>
 <p:sld xmlns:a="http://schemas.openxmlformats.org/drawingml/2006/main" xmlns:r="http://schemas.openxmlformats.org/officeDocument/2006/relationships" xmlns:p="http://schemas.openxmlformats.org/presentationml/2006/main">
   <p:cSld>
     <p:spTree>
@@ -18986,7 +19159,7 @@
             <a:fld id="{8C2E478F-E849-4A8C-AF1F-CBCC78A7CBFA}" type="slidenum">
               <a:rPr lang="en-US" smtClean="0"/>
               <a:pPr/>
-              <a:t>13</a:t>
+              <a:t>14</a:t>
             </a:fld>
             <a:endParaRPr lang="en-US" dirty="0"/>
           </a:p>
@@ -19005,7 +19178,7 @@
 </p:sld>
 </file>
 
-<file path=ppt/slides/slide14.xml><?xml version="1.0" encoding="utf-8"?>
+<file path=ppt/slides/slide15.xml><?xml version="1.0" encoding="utf-8"?>
 <p:sld xmlns:a="http://schemas.openxmlformats.org/drawingml/2006/main" xmlns:r="http://schemas.openxmlformats.org/officeDocument/2006/relationships" xmlns:p="http://schemas.openxmlformats.org/presentationml/2006/main">
   <p:cSld>
     <p:spTree>
@@ -20500,7 +20673,7 @@
             <a:fld id="{8C2E478F-E849-4A8C-AF1F-CBCC78A7CBFA}" type="slidenum">
               <a:rPr lang="en-US" smtClean="0"/>
               <a:pPr/>
-              <a:t>14</a:t>
+              <a:t>15</a:t>
             </a:fld>
             <a:endParaRPr lang="en-US" dirty="0"/>
           </a:p>
@@ -20519,7 +20692,7 @@
 </p:sld>
 </file>
 
-<file path=ppt/slides/slide15.xml><?xml version="1.0" encoding="utf-8"?>
+<file path=ppt/slides/slide16.xml><?xml version="1.0" encoding="utf-8"?>
 <p:sld xmlns:a="http://schemas.openxmlformats.org/drawingml/2006/main" xmlns:r="http://schemas.openxmlformats.org/officeDocument/2006/relationships" xmlns:p="http://schemas.openxmlformats.org/presentationml/2006/main">
   <p:cSld>
     <p:spTree>
@@ -21175,7 +21348,7 @@
             <a:fld id="{8C2E478F-E849-4A8C-AF1F-CBCC78A7CBFA}" type="slidenum">
               <a:rPr lang="en-US" smtClean="0"/>
               <a:pPr/>
-              <a:t>15</a:t>
+              <a:t>16</a:t>
             </a:fld>
             <a:endParaRPr lang="en-US" dirty="0"/>
           </a:p>
@@ -21194,7 +21367,7 @@
 </p:sld>
 </file>
 
-<file path=ppt/slides/slide16.xml><?xml version="1.0" encoding="utf-8"?>
+<file path=ppt/slides/slide17.xml><?xml version="1.0" encoding="utf-8"?>
 <p:sld xmlns:a="http://schemas.openxmlformats.org/drawingml/2006/main" xmlns:r="http://schemas.openxmlformats.org/officeDocument/2006/relationships" xmlns:p="http://schemas.openxmlformats.org/presentationml/2006/main">
   <p:cSld>
     <p:spTree>
@@ -21906,7 +22079,7 @@
             <a:fld id="{8C2E478F-E849-4A8C-AF1F-CBCC78A7CBFA}" type="slidenum">
               <a:rPr lang="en-US" smtClean="0"/>
               <a:pPr/>
-              <a:t>16</a:t>
+              <a:t>17</a:t>
             </a:fld>
             <a:endParaRPr lang="en-US" dirty="0"/>
           </a:p>
@@ -21925,7 +22098,7 @@
 </p:sld>
 </file>
 
-<file path=ppt/slides/slide17.xml><?xml version="1.0" encoding="utf-8"?>
+<file path=ppt/slides/slide18.xml><?xml version="1.0" encoding="utf-8"?>
 <p:sld xmlns:a="http://schemas.openxmlformats.org/drawingml/2006/main" xmlns:r="http://schemas.openxmlformats.org/officeDocument/2006/relationships" xmlns:p="http://schemas.openxmlformats.org/presentationml/2006/main">
   <p:cSld>
     <p:spTree>
@@ -22189,7 +22362,7 @@
             <a:fld id="{8C2E478F-E849-4A8C-AF1F-CBCC78A7CBFA}" type="slidenum">
               <a:rPr lang="en-US" smtClean="0"/>
               <a:pPr/>
-              <a:t>17</a:t>
+              <a:t>18</a:t>
             </a:fld>
             <a:endParaRPr lang="en-US" dirty="0"/>
           </a:p>
@@ -22208,7 +22381,7 @@
 </p:sld>
 </file>
 
-<file path=ppt/slides/slide18.xml><?xml version="1.0" encoding="utf-8"?>
+<file path=ppt/slides/slide19.xml><?xml version="1.0" encoding="utf-8"?>
 <p:sld xmlns:a="http://schemas.openxmlformats.org/drawingml/2006/main" xmlns:r="http://schemas.openxmlformats.org/officeDocument/2006/relationships" xmlns:p="http://schemas.openxmlformats.org/presentationml/2006/main">
   <p:cSld>
     <p:spTree>
@@ -22397,7 +22570,7 @@
             <a:fld id="{8C2E478F-E849-4A8C-AF1F-CBCC78A7CBFA}" type="slidenum">
               <a:rPr lang="en-US" smtClean="0"/>
               <a:pPr/>
-              <a:t>18</a:t>
+              <a:t>19</a:t>
             </a:fld>
             <a:endParaRPr lang="en-US" dirty="0"/>
           </a:p>
@@ -22416,7 +22589,779 @@
 </p:sld>
 </file>
 
-<file path=ppt/slides/slide19.xml><?xml version="1.0" encoding="utf-8"?>
+<file path=ppt/slides/slide2.xml><?xml version="1.0" encoding="utf-8"?>
+<p:sld xmlns:a="http://schemas.openxmlformats.org/drawingml/2006/main" xmlns:r="http://schemas.openxmlformats.org/officeDocument/2006/relationships" xmlns:p="http://schemas.openxmlformats.org/presentationml/2006/main">
+  <p:cSld>
+    <p:spTree>
+      <p:nvGrpSpPr>
+        <p:cNvPr id="1" name=""/>
+        <p:cNvGrpSpPr/>
+        <p:nvPr/>
+      </p:nvGrpSpPr>
+      <p:grpSpPr>
+        <a:xfrm>
+          <a:off x="0" y="0"/>
+          <a:ext cx="0" cy="0"/>
+          <a:chOff x="0" y="0"/>
+          <a:chExt cx="0" cy="0"/>
+        </a:xfrm>
+      </p:grpSpPr>
+      <p:pic>
+        <p:nvPicPr>
+          <p:cNvPr id="6" name="Picture Placeholder 5" descr="City Scape" title="City Scape">
+            <a:extLst>
+              <a:ext uri="{FF2B5EF4-FFF2-40B4-BE49-F238E27FC236}">
+                <a16:creationId xmlns:a16="http://schemas.microsoft.com/office/drawing/2014/main" id="{5E06080F-9F80-49D4-9D28-F3FD457E4278}"/>
+              </a:ext>
+            </a:extLst>
+          </p:cNvPr>
+          <p:cNvPicPr>
+            <a:picLocks noGrp="1" noChangeAspect="1"/>
+          </p:cNvPicPr>
+          <p:nvPr>
+            <p:ph type="pic" sz="quarter" idx="15"/>
+          </p:nvPr>
+        </p:nvPicPr>
+        <p:blipFill>
+          <a:blip r:embed="rId2">
+            <a:extLst>
+              <a:ext uri="{BEBA8EAE-BF5A-486C-A8C5-ECC9F3942E4B}">
+                <a14:imgProps xmlns:a14="http://schemas.microsoft.com/office/drawing/2010/main">
+                  <a14:imgLayer r:embed="rId3">
+                    <a14:imgEffect>
+                      <a14:brightnessContrast bright="-25000" contrast="18000"/>
+                    </a14:imgEffect>
+                  </a14:imgLayer>
+                </a14:imgProps>
+              </a:ext>
+              <a:ext uri="{28A0092B-C50C-407E-A947-70E740481C1C}">
+                <a14:useLocalDpi xmlns:a14="http://schemas.microsoft.com/office/drawing/2010/main" val="0"/>
+              </a:ext>
+            </a:extLst>
+          </a:blip>
+          <a:srcRect/>
+          <a:stretch>
+            <a:fillRect/>
+          </a:stretch>
+        </p:blipFill>
+        <p:spPr/>
+      </p:pic>
+      <p:grpSp>
+        <p:nvGrpSpPr>
+          <p:cNvPr id="31" name="Group 30">
+            <a:extLst>
+              <a:ext uri="{FF2B5EF4-FFF2-40B4-BE49-F238E27FC236}">
+                <a16:creationId xmlns:a16="http://schemas.microsoft.com/office/drawing/2014/main" id="{CDA17D7C-7C63-439C-8B50-C9B0F0F9AAF7}"/>
+              </a:ext>
+              <a:ext uri="{C183D7F6-B498-43B3-948B-1728B52AA6E4}">
+                <adec:decorative xmlns:adec="http://schemas.microsoft.com/office/drawing/2017/decorative" val="1"/>
+              </a:ext>
+            </a:extLst>
+          </p:cNvPr>
+          <p:cNvGrpSpPr/>
+          <p:nvPr/>
+        </p:nvGrpSpPr>
+        <p:grpSpPr>
+          <a:xfrm flipH="1">
+            <a:off x="4115984" y="252563"/>
+            <a:ext cx="7433283" cy="5995838"/>
+            <a:chOff x="252031" y="391887"/>
+            <a:chExt cx="7433283" cy="6215741"/>
+          </a:xfrm>
+        </p:grpSpPr>
+        <p:sp>
+          <p:nvSpPr>
+            <p:cNvPr id="32" name="Rectangle 31">
+              <a:extLst>
+                <a:ext uri="{FF2B5EF4-FFF2-40B4-BE49-F238E27FC236}">
+                  <a16:creationId xmlns:a16="http://schemas.microsoft.com/office/drawing/2014/main" id="{32FD79E9-DA87-4AE3-AB4F-454E8B1C7E28}"/>
+                </a:ext>
+              </a:extLst>
+            </p:cNvPr>
+            <p:cNvSpPr/>
+            <p:nvPr userDrawn="1"/>
+          </p:nvSpPr>
+          <p:spPr>
+            <a:xfrm>
+              <a:off x="609600" y="391887"/>
+              <a:ext cx="7075714" cy="5878284"/>
+            </a:xfrm>
+            <a:prstGeom prst="rect">
+              <a:avLst/>
+            </a:prstGeom>
+            <a:noFill/>
+            <a:ln w="127000">
+              <a:solidFill>
+                <a:schemeClr val="accent3"/>
+              </a:solidFill>
+            </a:ln>
+          </p:spPr>
+          <p:style>
+            <a:lnRef idx="2">
+              <a:schemeClr val="accent1">
+                <a:shade val="50000"/>
+              </a:schemeClr>
+            </a:lnRef>
+            <a:fillRef idx="1">
+              <a:schemeClr val="accent1"/>
+            </a:fillRef>
+            <a:effectRef idx="0">
+              <a:schemeClr val="accent1"/>
+            </a:effectRef>
+            <a:fontRef idx="minor">
+              <a:schemeClr val="lt1"/>
+            </a:fontRef>
+          </p:style>
+          <p:txBody>
+            <a:bodyPr rtlCol="0" anchor="ctr"/>
+            <a:lstStyle/>
+            <a:p>
+              <a:pPr algn="ctr"/>
+              <a:endParaRPr lang="en-US" dirty="0"/>
+            </a:p>
+          </p:txBody>
+        </p:sp>
+        <p:sp>
+          <p:nvSpPr>
+            <p:cNvPr id="33" name="Rectangle 32">
+              <a:extLst>
+                <a:ext uri="{FF2B5EF4-FFF2-40B4-BE49-F238E27FC236}">
+                  <a16:creationId xmlns:a16="http://schemas.microsoft.com/office/drawing/2014/main" id="{C0DB13C1-B4FB-4D33-A199-5BB34983AB47}"/>
+                </a:ext>
+              </a:extLst>
+            </p:cNvPr>
+            <p:cNvSpPr/>
+            <p:nvPr userDrawn="1"/>
+          </p:nvSpPr>
+          <p:spPr>
+            <a:xfrm>
+              <a:off x="979713" y="1181214"/>
+              <a:ext cx="6117771" cy="5426414"/>
+            </a:xfrm>
+            <a:prstGeom prst="rect">
+              <a:avLst/>
+            </a:prstGeom>
+            <a:gradFill>
+              <a:gsLst>
+                <a:gs pos="0">
+                  <a:srgbClr val="038B30">
+                    <a:alpha val="70000"/>
+                  </a:srgbClr>
+                </a:gs>
+                <a:gs pos="100000">
+                  <a:srgbClr val="C0F400">
+                    <a:alpha val="70000"/>
+                  </a:srgbClr>
+                </a:gs>
+                <a:gs pos="50000">
+                  <a:srgbClr val="05EE55">
+                    <a:alpha val="70000"/>
+                  </a:srgbClr>
+                </a:gs>
+              </a:gsLst>
+              <a:lin ang="16200000" scaled="1"/>
+            </a:gradFill>
+            <a:ln>
+              <a:noFill/>
+            </a:ln>
+          </p:spPr>
+          <p:style>
+            <a:lnRef idx="2">
+              <a:schemeClr val="accent1">
+                <a:shade val="50000"/>
+              </a:schemeClr>
+            </a:lnRef>
+            <a:fillRef idx="1">
+              <a:schemeClr val="accent1"/>
+            </a:fillRef>
+            <a:effectRef idx="0">
+              <a:schemeClr val="accent1"/>
+            </a:effectRef>
+            <a:fontRef idx="minor">
+              <a:schemeClr val="lt1"/>
+            </a:fontRef>
+          </p:style>
+          <p:txBody>
+            <a:bodyPr rtlCol="0" anchor="ctr"/>
+            <a:lstStyle/>
+            <a:p>
+              <a:pPr algn="ctr"/>
+              <a:r>
+                <a:rPr lang="en-US" dirty="0"/>
+                <a:t>2</a:t>
+              </a:r>
+            </a:p>
+            <a:p>
+              <a:pPr algn="ctr"/>
+              <a:endParaRPr lang="en-US" dirty="0"/>
+            </a:p>
+            <a:p>
+              <a:pPr algn="ctr"/>
+              <a:endParaRPr lang="en-US" dirty="0"/>
+            </a:p>
+            <a:p>
+              <a:pPr algn="ctr"/>
+              <a:endParaRPr lang="en-US" dirty="0"/>
+            </a:p>
+            <a:p>
+              <a:pPr algn="ctr"/>
+              <a:endParaRPr lang="en-US" dirty="0"/>
+            </a:p>
+            <a:p>
+              <a:pPr algn="ctr"/>
+              <a:endParaRPr lang="en-US" dirty="0"/>
+            </a:p>
+            <a:p>
+              <a:pPr algn="ctr"/>
+              <a:endParaRPr lang="en-US" dirty="0"/>
+            </a:p>
+            <a:p>
+              <a:pPr algn="ctr"/>
+              <a:endParaRPr lang="en-US" dirty="0"/>
+            </a:p>
+            <a:p>
+              <a:pPr algn="ctr"/>
+              <a:endParaRPr lang="en-US" dirty="0"/>
+            </a:p>
+            <a:p>
+              <a:pPr algn="ctr"/>
+              <a:endParaRPr lang="en-US" dirty="0"/>
+            </a:p>
+            <a:p>
+              <a:pPr algn="ctr"/>
+              <a:endParaRPr lang="en-US" dirty="0"/>
+            </a:p>
+            <a:p>
+              <a:pPr algn="ctr"/>
+              <a:endParaRPr lang="en-US" dirty="0"/>
+            </a:p>
+            <a:p>
+              <a:pPr algn="ctr"/>
+              <a:endParaRPr lang="en-US" dirty="0"/>
+            </a:p>
+            <a:p>
+              <a:pPr algn="ctr"/>
+              <a:endParaRPr lang="en-US" dirty="0"/>
+            </a:p>
+            <a:p>
+              <a:pPr algn="ctr"/>
+              <a:endParaRPr lang="en-US" dirty="0"/>
+            </a:p>
+            <a:p>
+              <a:pPr algn="ctr"/>
+              <a:endParaRPr lang="en-US" dirty="0"/>
+            </a:p>
+            <a:p>
+              <a:pPr algn="ctr"/>
+              <a:endParaRPr lang="en-US" dirty="0"/>
+            </a:p>
+            <a:p>
+              <a:pPr algn="ctr"/>
+              <a:endParaRPr lang="en-US" dirty="0"/>
+            </a:p>
+            <a:p>
+              <a:pPr algn="ctr"/>
+              <a:endParaRPr lang="en-US" dirty="0"/>
+            </a:p>
+            <a:p>
+              <a:pPr algn="ctr"/>
+              <a:endParaRPr lang="en-US" dirty="0"/>
+            </a:p>
+            <a:p>
+              <a:pPr algn="ctr"/>
+              <a:endParaRPr lang="en-US" dirty="0"/>
+            </a:p>
+            <a:p>
+              <a:pPr algn="ctr"/>
+              <a:endParaRPr lang="en-US" dirty="0"/>
+            </a:p>
+            <a:p>
+              <a:pPr algn="ctr"/>
+              <a:endParaRPr lang="en-US" dirty="0"/>
+            </a:p>
+            <a:p>
+              <a:pPr algn="ctr"/>
+              <a:endParaRPr lang="en-US" dirty="0"/>
+            </a:p>
+            <a:p>
+              <a:pPr algn="ctr"/>
+              <a:endParaRPr lang="en-US" dirty="0"/>
+            </a:p>
+            <a:p>
+              <a:pPr algn="ctr"/>
+              <a:endParaRPr lang="en-US" dirty="0"/>
+            </a:p>
+            <a:p>
+              <a:pPr algn="ctr"/>
+              <a:endParaRPr lang="en-US" dirty="0"/>
+            </a:p>
+            <a:p>
+              <a:pPr algn="ctr"/>
+              <a:endParaRPr lang="en-US" dirty="0"/>
+            </a:p>
+            <a:p>
+              <a:pPr algn="ctr"/>
+              <a:endParaRPr lang="en-US" dirty="0"/>
+            </a:p>
+            <a:p>
+              <a:pPr algn="ctr"/>
+              <a:endParaRPr lang="en-US" dirty="0"/>
+            </a:p>
+            <a:p>
+              <a:pPr algn="ctr"/>
+              <a:endParaRPr lang="en-US" dirty="0"/>
+            </a:p>
+            <a:p>
+              <a:pPr algn="ctr"/>
+              <a:endParaRPr lang="en-US" dirty="0"/>
+            </a:p>
+            <a:p>
+              <a:pPr algn="ctr"/>
+              <a:endParaRPr lang="en-US" dirty="0"/>
+            </a:p>
+            <a:p>
+              <a:pPr algn="ctr"/>
+              <a:endParaRPr lang="en-US" dirty="0"/>
+            </a:p>
+            <a:p>
+              <a:pPr algn="ctr"/>
+              <a:endParaRPr lang="en-US" dirty="0"/>
+            </a:p>
+            <a:p>
+              <a:pPr algn="ctr"/>
+              <a:endParaRPr lang="en-US" dirty="0"/>
+            </a:p>
+            <a:p>
+              <a:pPr algn="ctr"/>
+              <a:endParaRPr lang="en-US" dirty="0"/>
+            </a:p>
+            <a:p>
+              <a:pPr algn="ctr"/>
+              <a:endParaRPr lang="en-US" dirty="0"/>
+            </a:p>
+            <a:p>
+              <a:pPr algn="ctr"/>
+              <a:endParaRPr lang="en-US" dirty="0"/>
+            </a:p>
+            <a:p>
+              <a:pPr algn="ctr"/>
+              <a:endParaRPr lang="en-US" dirty="0"/>
+            </a:p>
+            <a:p>
+              <a:pPr algn="ctr"/>
+              <a:endParaRPr lang="en-US" dirty="0"/>
+            </a:p>
+            <a:p>
+              <a:pPr algn="ctr"/>
+              <a:endParaRPr lang="en-US" dirty="0"/>
+            </a:p>
+            <a:p>
+              <a:pPr algn="ctr"/>
+              <a:endParaRPr lang="en-US" dirty="0"/>
+            </a:p>
+            <a:p>
+              <a:pPr algn="ctr"/>
+              <a:endParaRPr lang="en-US" dirty="0"/>
+            </a:p>
+            <a:p>
+              <a:pPr algn="ctr"/>
+              <a:endParaRPr lang="en-US" dirty="0"/>
+            </a:p>
+            <a:p>
+              <a:pPr algn="ctr"/>
+              <a:endParaRPr lang="en-US" dirty="0"/>
+            </a:p>
+            <a:p>
+              <a:pPr algn="ctr"/>
+              <a:endParaRPr lang="en-US" dirty="0"/>
+            </a:p>
+            <a:p>
+              <a:pPr algn="ctr"/>
+              <a:endParaRPr lang="en-US" dirty="0"/>
+            </a:p>
+            <a:p>
+              <a:pPr algn="ctr"/>
+              <a:endParaRPr lang="en-US" dirty="0"/>
+            </a:p>
+            <a:p>
+              <a:pPr algn="ctr"/>
+              <a:endParaRPr lang="en-US" dirty="0"/>
+            </a:p>
+            <a:p>
+              <a:pPr algn="ctr"/>
+              <a:endParaRPr lang="en-US" dirty="0"/>
+            </a:p>
+            <a:p>
+              <a:pPr algn="ctr"/>
+              <a:endParaRPr lang="en-US" dirty="0"/>
+            </a:p>
+            <a:p>
+              <a:pPr algn="ctr"/>
+              <a:endParaRPr lang="en-US" dirty="0"/>
+            </a:p>
+            <a:p>
+              <a:pPr algn="ctr"/>
+              <a:endParaRPr lang="en-US" dirty="0"/>
+            </a:p>
+            <a:p>
+              <a:pPr algn="ctr"/>
+              <a:endParaRPr lang="en-US" dirty="0"/>
+            </a:p>
+            <a:p>
+              <a:pPr algn="ctr"/>
+              <a:endParaRPr lang="en-US" dirty="0"/>
+            </a:p>
+            <a:p>
+              <a:pPr algn="ctr"/>
+              <a:endParaRPr lang="en-US" dirty="0"/>
+            </a:p>
+            <a:p>
+              <a:pPr algn="ctr"/>
+              <a:endParaRPr lang="en-US" dirty="0"/>
+            </a:p>
+            <a:p>
+              <a:pPr algn="ctr"/>
+              <a:endParaRPr lang="en-US" dirty="0"/>
+            </a:p>
+            <a:p>
+              <a:pPr algn="ctr"/>
+              <a:endParaRPr lang="en-US" dirty="0"/>
+            </a:p>
+            <a:p>
+              <a:pPr algn="ctr"/>
+              <a:endParaRPr lang="en-US" dirty="0"/>
+            </a:p>
+            <a:p>
+              <a:pPr algn="ctr"/>
+              <a:endParaRPr lang="en-US" dirty="0"/>
+            </a:p>
+            <a:p>
+              <a:pPr algn="ctr"/>
+              <a:endParaRPr lang="en-US" dirty="0"/>
+            </a:p>
+            <a:p>
+              <a:pPr algn="ctr"/>
+              <a:endParaRPr lang="en-US" dirty="0"/>
+            </a:p>
+            <a:p>
+              <a:pPr algn="ctr"/>
+              <a:endParaRPr lang="en-US" dirty="0"/>
+            </a:p>
+            <a:p>
+              <a:pPr algn="ctr"/>
+              <a:endParaRPr lang="en-US" dirty="0"/>
+            </a:p>
+            <a:p>
+              <a:pPr algn="ctr"/>
+              <a:r>
+                <a:rPr lang="en-US" dirty="0"/>
+                <a:t>+</a:t>
+              </a:r>
+            </a:p>
+            <a:p>
+              <a:pPr algn="ctr"/>
+              <a:endParaRPr lang="en-US" dirty="0"/>
+            </a:p>
+          </p:txBody>
+        </p:sp>
+        <p:sp>
+          <p:nvSpPr>
+            <p:cNvPr id="34" name="Rectangle 33">
+              <a:extLst>
+                <a:ext uri="{FF2B5EF4-FFF2-40B4-BE49-F238E27FC236}">
+                  <a16:creationId xmlns:a16="http://schemas.microsoft.com/office/drawing/2014/main" id="{97CAE694-E5D7-45D8-80CE-4067B6610E53}"/>
+                </a:ext>
+              </a:extLst>
+            </p:cNvPr>
+            <p:cNvSpPr/>
+            <p:nvPr userDrawn="1"/>
+          </p:nvSpPr>
+          <p:spPr>
+            <a:xfrm>
+              <a:off x="252031" y="655467"/>
+              <a:ext cx="6475341" cy="5701790"/>
+            </a:xfrm>
+            <a:prstGeom prst="rect">
+              <a:avLst/>
+            </a:prstGeom>
+            <a:solidFill>
+              <a:schemeClr val="bg1"/>
+            </a:solidFill>
+            <a:ln>
+              <a:noFill/>
+            </a:ln>
+          </p:spPr>
+          <p:style>
+            <a:lnRef idx="2">
+              <a:schemeClr val="accent1">
+                <a:shade val="50000"/>
+              </a:schemeClr>
+            </a:lnRef>
+            <a:fillRef idx="1">
+              <a:schemeClr val="accent1"/>
+            </a:fillRef>
+            <a:effectRef idx="0">
+              <a:schemeClr val="accent1"/>
+            </a:effectRef>
+            <a:fontRef idx="minor">
+              <a:schemeClr val="lt1"/>
+            </a:fontRef>
+          </p:style>
+          <p:txBody>
+            <a:bodyPr rtlCol="0" anchor="ctr"/>
+            <a:lstStyle/>
+            <a:p>
+              <a:pPr algn="ctr"/>
+              <a:endParaRPr lang="en-US" dirty="0"/>
+            </a:p>
+          </p:txBody>
+        </p:sp>
+      </p:grpSp>
+      <p:sp>
+        <p:nvSpPr>
+          <p:cNvPr id="7" name="Title 6">
+            <a:extLst>
+              <a:ext uri="{FF2B5EF4-FFF2-40B4-BE49-F238E27FC236}">
+                <a16:creationId xmlns:a16="http://schemas.microsoft.com/office/drawing/2014/main" id="{D5445F47-6D74-450C-BC16-998D2021AD78}"/>
+              </a:ext>
+            </a:extLst>
+          </p:cNvPr>
+          <p:cNvSpPr>
+            <a:spLocks noGrp="1"/>
+          </p:cNvSpPr>
+          <p:nvPr>
+            <p:ph type="title"/>
+          </p:nvPr>
+        </p:nvSpPr>
+        <p:spPr/>
+        <p:txBody>
+          <a:bodyPr/>
+          <a:lstStyle/>
+          <a:p>
+            <a:r>
+              <a:rPr lang="en-US" dirty="0"/>
+              <a:t>PORTFOLIO SUITABILITY APP</a:t>
+            </a:r>
+          </a:p>
+        </p:txBody>
+      </p:sp>
+      <p:sp>
+        <p:nvSpPr>
+          <p:cNvPr id="9" name="Text Placeholder 8">
+            <a:extLst>
+              <a:ext uri="{FF2B5EF4-FFF2-40B4-BE49-F238E27FC236}">
+                <a16:creationId xmlns:a16="http://schemas.microsoft.com/office/drawing/2014/main" id="{4744B28E-5E14-4A77-AD4F-C979905862BF}"/>
+              </a:ext>
+            </a:extLst>
+          </p:cNvPr>
+          <p:cNvSpPr>
+            <a:spLocks noGrp="1"/>
+          </p:cNvSpPr>
+          <p:nvPr>
+            <p:ph type="body" idx="13"/>
+          </p:nvPr>
+        </p:nvSpPr>
+        <p:spPr>
+          <a:xfrm>
+            <a:off x="6547865" y="1497308"/>
+            <a:ext cx="3883398" cy="696829"/>
+          </a:xfrm>
+        </p:spPr>
+        <p:txBody>
+          <a:bodyPr/>
+          <a:lstStyle/>
+          <a:p>
+            <a:pPr algn="ctr"/>
+            <a:r>
+              <a:rPr lang="en-US" dirty="0"/>
+              <a:t>ATTRACT CLIENTS WITH A FREE REPORT</a:t>
+            </a:r>
+          </a:p>
+        </p:txBody>
+      </p:sp>
+      <p:sp>
+        <p:nvSpPr>
+          <p:cNvPr id="4" name="Content Placeholder 3">
+            <a:extLst>
+              <a:ext uri="{FF2B5EF4-FFF2-40B4-BE49-F238E27FC236}">
+                <a16:creationId xmlns:a16="http://schemas.microsoft.com/office/drawing/2014/main" id="{2885A4AC-9AA0-4EFF-8162-609223BF5D70}"/>
+              </a:ext>
+            </a:extLst>
+          </p:cNvPr>
+          <p:cNvSpPr>
+            <a:spLocks noGrp="1"/>
+          </p:cNvSpPr>
+          <p:nvPr>
+            <p:ph idx="1"/>
+          </p:nvPr>
+        </p:nvSpPr>
+        <p:spPr>
+          <a:xfrm>
+            <a:off x="5510539" y="2957282"/>
+            <a:ext cx="6117771" cy="1938047"/>
+          </a:xfrm>
+        </p:spPr>
+        <p:txBody>
+          <a:bodyPr>
+            <a:normAutofit fontScale="92500" lnSpcReduction="20000"/>
+          </a:bodyPr>
+          <a:lstStyle/>
+          <a:p>
+            <a:pPr marL="0" indent="0">
+              <a:buNone/>
+            </a:pPr>
+            <a:r>
+              <a:rPr lang="en-US" dirty="0"/>
+              <a:t>You can attract new clients by giving them something for free according to the marketing rule of reciprocity. This app allows you to offer a free report to potential clients that suggests a portfolio of ETFs based on their risk tolerance and investing goals.  That report starts a conversation that enables you to show how you can customize a portfolio for them and how it would compare to common benchmarks like the S&amp;P 500.</a:t>
+            </a:r>
+          </a:p>
+        </p:txBody>
+      </p:sp>
+      <p:sp>
+        <p:nvSpPr>
+          <p:cNvPr id="11" name="Rectangle: Single Corner Snipped 10">
+            <a:extLst>
+              <a:ext uri="{FF2B5EF4-FFF2-40B4-BE49-F238E27FC236}">
+                <a16:creationId xmlns:a16="http://schemas.microsoft.com/office/drawing/2014/main" id="{851F9C8F-B284-4FE9-A76C-49BE3BEE3853}"/>
+              </a:ext>
+              <a:ext uri="{C183D7F6-B498-43B3-948B-1728B52AA6E4}">
+                <adec:decorative xmlns:adec="http://schemas.microsoft.com/office/drawing/2017/decorative" val="1"/>
+              </a:ext>
+            </a:extLst>
+          </p:cNvPr>
+          <p:cNvSpPr/>
+          <p:nvPr/>
+        </p:nvSpPr>
+        <p:spPr>
+          <a:xfrm flipH="1">
+            <a:off x="11549269" y="6356350"/>
+            <a:ext cx="642731" cy="501650"/>
+          </a:xfrm>
+          <a:prstGeom prst="snip1Rect">
+            <a:avLst/>
+          </a:prstGeom>
+          <a:solidFill>
+            <a:srgbClr val="2F3342"/>
+          </a:solidFill>
+          <a:ln>
+            <a:noFill/>
+          </a:ln>
+        </p:spPr>
+        <p:style>
+          <a:lnRef idx="2">
+            <a:schemeClr val="accent1">
+              <a:shade val="50000"/>
+            </a:schemeClr>
+          </a:lnRef>
+          <a:fillRef idx="1">
+            <a:schemeClr val="accent1"/>
+          </a:fillRef>
+          <a:effectRef idx="0">
+            <a:schemeClr val="accent1"/>
+          </a:effectRef>
+          <a:fontRef idx="minor">
+            <a:schemeClr val="lt1"/>
+          </a:fontRef>
+        </p:style>
+        <p:txBody>
+          <a:bodyPr rtlCol="0" anchor="ctr"/>
+          <a:lstStyle/>
+          <a:p>
+            <a:pPr algn="ctr"/>
+            <a:endParaRPr lang="en-US" dirty="0"/>
+          </a:p>
+        </p:txBody>
+      </p:sp>
+      <p:sp>
+        <p:nvSpPr>
+          <p:cNvPr id="12" name="Slide Number Placeholder 5">
+            <a:extLst>
+              <a:ext uri="{FF2B5EF4-FFF2-40B4-BE49-F238E27FC236}">
+                <a16:creationId xmlns:a16="http://schemas.microsoft.com/office/drawing/2014/main" id="{75EF0122-21C6-4139-B8D0-688B2553C487}"/>
+              </a:ext>
+            </a:extLst>
+          </p:cNvPr>
+          <p:cNvSpPr>
+            <a:spLocks noGrp="1"/>
+          </p:cNvSpPr>
+          <p:nvPr>
+            <p:ph type="sldNum" sz="quarter" idx="17"/>
+          </p:nvPr>
+        </p:nvSpPr>
+        <p:spPr>
+          <a:xfrm>
+            <a:off x="11549268" y="6413649"/>
+            <a:ext cx="642731" cy="407804"/>
+          </a:xfrm>
+          <a:prstGeom prst="rect">
+            <a:avLst/>
+          </a:prstGeom>
+        </p:spPr>
+        <p:txBody>
+          <a:bodyPr vert="horz" lIns="91440" tIns="45720" rIns="91440" bIns="45720" rtlCol="0" anchor="ctr"/>
+          <a:lstStyle>
+            <a:lvl1pPr algn="ctr">
+              <a:defRPr sz="1200">
+                <a:solidFill>
+                  <a:schemeClr val="bg1"/>
+                </a:solidFill>
+              </a:defRPr>
+            </a:lvl1pPr>
+          </a:lstStyle>
+          <a:p>
+            <a:fld id="{8C2E478F-E849-4A8C-AF1F-CBCC78A7CBFA}" type="slidenum">
+              <a:rPr lang="en-US" smtClean="0"/>
+              <a:pPr/>
+              <a:t>2</a:t>
+            </a:fld>
+            <a:endParaRPr lang="en-US" dirty="0"/>
+          </a:p>
+        </p:txBody>
+      </p:sp>
+      <p:pic>
+        <p:nvPicPr>
+          <p:cNvPr id="13" name="Picture 12">
+            <a:extLst>
+              <a:ext uri="{FF2B5EF4-FFF2-40B4-BE49-F238E27FC236}">
+                <a16:creationId xmlns:a16="http://schemas.microsoft.com/office/drawing/2014/main" id="{45D1FB63-27D7-4E49-B69D-2E329333B015}"/>
+              </a:ext>
+            </a:extLst>
+          </p:cNvPr>
+          <p:cNvPicPr>
+            <a:picLocks noChangeAspect="1"/>
+          </p:cNvPicPr>
+          <p:nvPr/>
+        </p:nvPicPr>
+        <p:blipFill>
+          <a:blip r:embed="rId4"/>
+          <a:stretch>
+            <a:fillRect/>
+          </a:stretch>
+        </p:blipFill>
+        <p:spPr>
+          <a:xfrm>
+            <a:off x="109845" y="55261"/>
+            <a:ext cx="969348" cy="1066892"/>
+          </a:xfrm>
+          <a:prstGeom prst="rect">
+            <a:avLst/>
+          </a:prstGeom>
+        </p:spPr>
+      </p:pic>
+    </p:spTree>
+    <p:extLst>
+      <p:ext uri="{BB962C8B-B14F-4D97-AF65-F5344CB8AC3E}">
+        <p14:creationId xmlns:p14="http://schemas.microsoft.com/office/powerpoint/2010/main" val="259734590"/>
+      </p:ext>
+    </p:extLst>
+  </p:cSld>
+  <p:clrMapOvr>
+    <a:masterClrMapping/>
+  </p:clrMapOvr>
+</p:sld>
+</file>
+
+<file path=ppt/slides/slide20.xml><?xml version="1.0" encoding="utf-8"?>
 <p:sld xmlns:a="http://schemas.openxmlformats.org/drawingml/2006/main" xmlns:r="http://schemas.openxmlformats.org/officeDocument/2006/relationships" xmlns:p="http://schemas.openxmlformats.org/presentationml/2006/main">
   <p:cSld>
     <p:spTree>
@@ -24378,7 +25323,7 @@
             <a:fld id="{8C2E478F-E849-4A8C-AF1F-CBCC78A7CBFA}" type="slidenum">
               <a:rPr lang="en-US" smtClean="0"/>
               <a:pPr/>
-              <a:t>19</a:t>
+              <a:t>20</a:t>
             </a:fld>
             <a:endParaRPr lang="en-US" dirty="0"/>
           </a:p>
@@ -24397,779 +25342,7 @@
 </p:sld>
 </file>
 
-<file path=ppt/slides/slide2.xml><?xml version="1.0" encoding="utf-8"?>
-<p:sld xmlns:a="http://schemas.openxmlformats.org/drawingml/2006/main" xmlns:r="http://schemas.openxmlformats.org/officeDocument/2006/relationships" xmlns:p="http://schemas.openxmlformats.org/presentationml/2006/main">
-  <p:cSld>
-    <p:spTree>
-      <p:nvGrpSpPr>
-        <p:cNvPr id="1" name=""/>
-        <p:cNvGrpSpPr/>
-        <p:nvPr/>
-      </p:nvGrpSpPr>
-      <p:grpSpPr>
-        <a:xfrm>
-          <a:off x="0" y="0"/>
-          <a:ext cx="0" cy="0"/>
-          <a:chOff x="0" y="0"/>
-          <a:chExt cx="0" cy="0"/>
-        </a:xfrm>
-      </p:grpSpPr>
-      <p:pic>
-        <p:nvPicPr>
-          <p:cNvPr id="6" name="Picture Placeholder 5" descr="City Scape" title="City Scape">
-            <a:extLst>
-              <a:ext uri="{FF2B5EF4-FFF2-40B4-BE49-F238E27FC236}">
-                <a16:creationId xmlns:a16="http://schemas.microsoft.com/office/drawing/2014/main" id="{5E06080F-9F80-49D4-9D28-F3FD457E4278}"/>
-              </a:ext>
-            </a:extLst>
-          </p:cNvPr>
-          <p:cNvPicPr>
-            <a:picLocks noGrp="1" noChangeAspect="1"/>
-          </p:cNvPicPr>
-          <p:nvPr>
-            <p:ph type="pic" sz="quarter" idx="15"/>
-          </p:nvPr>
-        </p:nvPicPr>
-        <p:blipFill>
-          <a:blip r:embed="rId2">
-            <a:extLst>
-              <a:ext uri="{BEBA8EAE-BF5A-486C-A8C5-ECC9F3942E4B}">
-                <a14:imgProps xmlns:a14="http://schemas.microsoft.com/office/drawing/2010/main">
-                  <a14:imgLayer r:embed="rId3">
-                    <a14:imgEffect>
-                      <a14:brightnessContrast bright="-25000" contrast="18000"/>
-                    </a14:imgEffect>
-                  </a14:imgLayer>
-                </a14:imgProps>
-              </a:ext>
-              <a:ext uri="{28A0092B-C50C-407E-A947-70E740481C1C}">
-                <a14:useLocalDpi xmlns:a14="http://schemas.microsoft.com/office/drawing/2010/main" val="0"/>
-              </a:ext>
-            </a:extLst>
-          </a:blip>
-          <a:srcRect/>
-          <a:stretch>
-            <a:fillRect/>
-          </a:stretch>
-        </p:blipFill>
-        <p:spPr/>
-      </p:pic>
-      <p:grpSp>
-        <p:nvGrpSpPr>
-          <p:cNvPr id="31" name="Group 30">
-            <a:extLst>
-              <a:ext uri="{FF2B5EF4-FFF2-40B4-BE49-F238E27FC236}">
-                <a16:creationId xmlns:a16="http://schemas.microsoft.com/office/drawing/2014/main" id="{CDA17D7C-7C63-439C-8B50-C9B0F0F9AAF7}"/>
-              </a:ext>
-              <a:ext uri="{C183D7F6-B498-43B3-948B-1728B52AA6E4}">
-                <adec:decorative xmlns:adec="http://schemas.microsoft.com/office/drawing/2017/decorative" val="1"/>
-              </a:ext>
-            </a:extLst>
-          </p:cNvPr>
-          <p:cNvGrpSpPr/>
-          <p:nvPr/>
-        </p:nvGrpSpPr>
-        <p:grpSpPr>
-          <a:xfrm flipH="1">
-            <a:off x="4115984" y="252563"/>
-            <a:ext cx="7433283" cy="5995838"/>
-            <a:chOff x="252031" y="391887"/>
-            <a:chExt cx="7433283" cy="6215741"/>
-          </a:xfrm>
-        </p:grpSpPr>
-        <p:sp>
-          <p:nvSpPr>
-            <p:cNvPr id="32" name="Rectangle 31">
-              <a:extLst>
-                <a:ext uri="{FF2B5EF4-FFF2-40B4-BE49-F238E27FC236}">
-                  <a16:creationId xmlns:a16="http://schemas.microsoft.com/office/drawing/2014/main" id="{32FD79E9-DA87-4AE3-AB4F-454E8B1C7E28}"/>
-                </a:ext>
-              </a:extLst>
-            </p:cNvPr>
-            <p:cNvSpPr/>
-            <p:nvPr userDrawn="1"/>
-          </p:nvSpPr>
-          <p:spPr>
-            <a:xfrm>
-              <a:off x="609600" y="391887"/>
-              <a:ext cx="7075714" cy="5878284"/>
-            </a:xfrm>
-            <a:prstGeom prst="rect">
-              <a:avLst/>
-            </a:prstGeom>
-            <a:noFill/>
-            <a:ln w="127000">
-              <a:solidFill>
-                <a:schemeClr val="accent3"/>
-              </a:solidFill>
-            </a:ln>
-          </p:spPr>
-          <p:style>
-            <a:lnRef idx="2">
-              <a:schemeClr val="accent1">
-                <a:shade val="50000"/>
-              </a:schemeClr>
-            </a:lnRef>
-            <a:fillRef idx="1">
-              <a:schemeClr val="accent1"/>
-            </a:fillRef>
-            <a:effectRef idx="0">
-              <a:schemeClr val="accent1"/>
-            </a:effectRef>
-            <a:fontRef idx="minor">
-              <a:schemeClr val="lt1"/>
-            </a:fontRef>
-          </p:style>
-          <p:txBody>
-            <a:bodyPr rtlCol="0" anchor="ctr"/>
-            <a:lstStyle/>
-            <a:p>
-              <a:pPr algn="ctr"/>
-              <a:endParaRPr lang="en-US" dirty="0"/>
-            </a:p>
-          </p:txBody>
-        </p:sp>
-        <p:sp>
-          <p:nvSpPr>
-            <p:cNvPr id="33" name="Rectangle 32">
-              <a:extLst>
-                <a:ext uri="{FF2B5EF4-FFF2-40B4-BE49-F238E27FC236}">
-                  <a16:creationId xmlns:a16="http://schemas.microsoft.com/office/drawing/2014/main" id="{C0DB13C1-B4FB-4D33-A199-5BB34983AB47}"/>
-                </a:ext>
-              </a:extLst>
-            </p:cNvPr>
-            <p:cNvSpPr/>
-            <p:nvPr userDrawn="1"/>
-          </p:nvSpPr>
-          <p:spPr>
-            <a:xfrm>
-              <a:off x="979713" y="1181214"/>
-              <a:ext cx="6117771" cy="5426414"/>
-            </a:xfrm>
-            <a:prstGeom prst="rect">
-              <a:avLst/>
-            </a:prstGeom>
-            <a:gradFill>
-              <a:gsLst>
-                <a:gs pos="0">
-                  <a:srgbClr val="038B30">
-                    <a:alpha val="70000"/>
-                  </a:srgbClr>
-                </a:gs>
-                <a:gs pos="100000">
-                  <a:srgbClr val="C0F400">
-                    <a:alpha val="70000"/>
-                  </a:srgbClr>
-                </a:gs>
-                <a:gs pos="50000">
-                  <a:srgbClr val="05EE55">
-                    <a:alpha val="70000"/>
-                  </a:srgbClr>
-                </a:gs>
-              </a:gsLst>
-              <a:lin ang="16200000" scaled="1"/>
-            </a:gradFill>
-            <a:ln>
-              <a:noFill/>
-            </a:ln>
-          </p:spPr>
-          <p:style>
-            <a:lnRef idx="2">
-              <a:schemeClr val="accent1">
-                <a:shade val="50000"/>
-              </a:schemeClr>
-            </a:lnRef>
-            <a:fillRef idx="1">
-              <a:schemeClr val="accent1"/>
-            </a:fillRef>
-            <a:effectRef idx="0">
-              <a:schemeClr val="accent1"/>
-            </a:effectRef>
-            <a:fontRef idx="minor">
-              <a:schemeClr val="lt1"/>
-            </a:fontRef>
-          </p:style>
-          <p:txBody>
-            <a:bodyPr rtlCol="0" anchor="ctr"/>
-            <a:lstStyle/>
-            <a:p>
-              <a:pPr algn="ctr"/>
-              <a:r>
-                <a:rPr lang="en-US" dirty="0"/>
-                <a:t>2</a:t>
-              </a:r>
-            </a:p>
-            <a:p>
-              <a:pPr algn="ctr"/>
-              <a:endParaRPr lang="en-US" dirty="0"/>
-            </a:p>
-            <a:p>
-              <a:pPr algn="ctr"/>
-              <a:endParaRPr lang="en-US" dirty="0"/>
-            </a:p>
-            <a:p>
-              <a:pPr algn="ctr"/>
-              <a:endParaRPr lang="en-US" dirty="0"/>
-            </a:p>
-            <a:p>
-              <a:pPr algn="ctr"/>
-              <a:endParaRPr lang="en-US" dirty="0"/>
-            </a:p>
-            <a:p>
-              <a:pPr algn="ctr"/>
-              <a:endParaRPr lang="en-US" dirty="0"/>
-            </a:p>
-            <a:p>
-              <a:pPr algn="ctr"/>
-              <a:endParaRPr lang="en-US" dirty="0"/>
-            </a:p>
-            <a:p>
-              <a:pPr algn="ctr"/>
-              <a:endParaRPr lang="en-US" dirty="0"/>
-            </a:p>
-            <a:p>
-              <a:pPr algn="ctr"/>
-              <a:endParaRPr lang="en-US" dirty="0"/>
-            </a:p>
-            <a:p>
-              <a:pPr algn="ctr"/>
-              <a:endParaRPr lang="en-US" dirty="0"/>
-            </a:p>
-            <a:p>
-              <a:pPr algn="ctr"/>
-              <a:endParaRPr lang="en-US" dirty="0"/>
-            </a:p>
-            <a:p>
-              <a:pPr algn="ctr"/>
-              <a:endParaRPr lang="en-US" dirty="0"/>
-            </a:p>
-            <a:p>
-              <a:pPr algn="ctr"/>
-              <a:endParaRPr lang="en-US" dirty="0"/>
-            </a:p>
-            <a:p>
-              <a:pPr algn="ctr"/>
-              <a:endParaRPr lang="en-US" dirty="0"/>
-            </a:p>
-            <a:p>
-              <a:pPr algn="ctr"/>
-              <a:endParaRPr lang="en-US" dirty="0"/>
-            </a:p>
-            <a:p>
-              <a:pPr algn="ctr"/>
-              <a:endParaRPr lang="en-US" dirty="0"/>
-            </a:p>
-            <a:p>
-              <a:pPr algn="ctr"/>
-              <a:endParaRPr lang="en-US" dirty="0"/>
-            </a:p>
-            <a:p>
-              <a:pPr algn="ctr"/>
-              <a:endParaRPr lang="en-US" dirty="0"/>
-            </a:p>
-            <a:p>
-              <a:pPr algn="ctr"/>
-              <a:endParaRPr lang="en-US" dirty="0"/>
-            </a:p>
-            <a:p>
-              <a:pPr algn="ctr"/>
-              <a:endParaRPr lang="en-US" dirty="0"/>
-            </a:p>
-            <a:p>
-              <a:pPr algn="ctr"/>
-              <a:endParaRPr lang="en-US" dirty="0"/>
-            </a:p>
-            <a:p>
-              <a:pPr algn="ctr"/>
-              <a:endParaRPr lang="en-US" dirty="0"/>
-            </a:p>
-            <a:p>
-              <a:pPr algn="ctr"/>
-              <a:endParaRPr lang="en-US" dirty="0"/>
-            </a:p>
-            <a:p>
-              <a:pPr algn="ctr"/>
-              <a:endParaRPr lang="en-US" dirty="0"/>
-            </a:p>
-            <a:p>
-              <a:pPr algn="ctr"/>
-              <a:endParaRPr lang="en-US" dirty="0"/>
-            </a:p>
-            <a:p>
-              <a:pPr algn="ctr"/>
-              <a:endParaRPr lang="en-US" dirty="0"/>
-            </a:p>
-            <a:p>
-              <a:pPr algn="ctr"/>
-              <a:endParaRPr lang="en-US" dirty="0"/>
-            </a:p>
-            <a:p>
-              <a:pPr algn="ctr"/>
-              <a:endParaRPr lang="en-US" dirty="0"/>
-            </a:p>
-            <a:p>
-              <a:pPr algn="ctr"/>
-              <a:endParaRPr lang="en-US" dirty="0"/>
-            </a:p>
-            <a:p>
-              <a:pPr algn="ctr"/>
-              <a:endParaRPr lang="en-US" dirty="0"/>
-            </a:p>
-            <a:p>
-              <a:pPr algn="ctr"/>
-              <a:endParaRPr lang="en-US" dirty="0"/>
-            </a:p>
-            <a:p>
-              <a:pPr algn="ctr"/>
-              <a:endParaRPr lang="en-US" dirty="0"/>
-            </a:p>
-            <a:p>
-              <a:pPr algn="ctr"/>
-              <a:endParaRPr lang="en-US" dirty="0"/>
-            </a:p>
-            <a:p>
-              <a:pPr algn="ctr"/>
-              <a:endParaRPr lang="en-US" dirty="0"/>
-            </a:p>
-            <a:p>
-              <a:pPr algn="ctr"/>
-              <a:endParaRPr lang="en-US" dirty="0"/>
-            </a:p>
-            <a:p>
-              <a:pPr algn="ctr"/>
-              <a:endParaRPr lang="en-US" dirty="0"/>
-            </a:p>
-            <a:p>
-              <a:pPr algn="ctr"/>
-              <a:endParaRPr lang="en-US" dirty="0"/>
-            </a:p>
-            <a:p>
-              <a:pPr algn="ctr"/>
-              <a:endParaRPr lang="en-US" dirty="0"/>
-            </a:p>
-            <a:p>
-              <a:pPr algn="ctr"/>
-              <a:endParaRPr lang="en-US" dirty="0"/>
-            </a:p>
-            <a:p>
-              <a:pPr algn="ctr"/>
-              <a:endParaRPr lang="en-US" dirty="0"/>
-            </a:p>
-            <a:p>
-              <a:pPr algn="ctr"/>
-              <a:endParaRPr lang="en-US" dirty="0"/>
-            </a:p>
-            <a:p>
-              <a:pPr algn="ctr"/>
-              <a:endParaRPr lang="en-US" dirty="0"/>
-            </a:p>
-            <a:p>
-              <a:pPr algn="ctr"/>
-              <a:endParaRPr lang="en-US" dirty="0"/>
-            </a:p>
-            <a:p>
-              <a:pPr algn="ctr"/>
-              <a:endParaRPr lang="en-US" dirty="0"/>
-            </a:p>
-            <a:p>
-              <a:pPr algn="ctr"/>
-              <a:endParaRPr lang="en-US" dirty="0"/>
-            </a:p>
-            <a:p>
-              <a:pPr algn="ctr"/>
-              <a:endParaRPr lang="en-US" dirty="0"/>
-            </a:p>
-            <a:p>
-              <a:pPr algn="ctr"/>
-              <a:endParaRPr lang="en-US" dirty="0"/>
-            </a:p>
-            <a:p>
-              <a:pPr algn="ctr"/>
-              <a:endParaRPr lang="en-US" dirty="0"/>
-            </a:p>
-            <a:p>
-              <a:pPr algn="ctr"/>
-              <a:endParaRPr lang="en-US" dirty="0"/>
-            </a:p>
-            <a:p>
-              <a:pPr algn="ctr"/>
-              <a:endParaRPr lang="en-US" dirty="0"/>
-            </a:p>
-            <a:p>
-              <a:pPr algn="ctr"/>
-              <a:endParaRPr lang="en-US" dirty="0"/>
-            </a:p>
-            <a:p>
-              <a:pPr algn="ctr"/>
-              <a:endParaRPr lang="en-US" dirty="0"/>
-            </a:p>
-            <a:p>
-              <a:pPr algn="ctr"/>
-              <a:endParaRPr lang="en-US" dirty="0"/>
-            </a:p>
-            <a:p>
-              <a:pPr algn="ctr"/>
-              <a:endParaRPr lang="en-US" dirty="0"/>
-            </a:p>
-            <a:p>
-              <a:pPr algn="ctr"/>
-              <a:endParaRPr lang="en-US" dirty="0"/>
-            </a:p>
-            <a:p>
-              <a:pPr algn="ctr"/>
-              <a:endParaRPr lang="en-US" dirty="0"/>
-            </a:p>
-            <a:p>
-              <a:pPr algn="ctr"/>
-              <a:endParaRPr lang="en-US" dirty="0"/>
-            </a:p>
-            <a:p>
-              <a:pPr algn="ctr"/>
-              <a:endParaRPr lang="en-US" dirty="0"/>
-            </a:p>
-            <a:p>
-              <a:pPr algn="ctr"/>
-              <a:endParaRPr lang="en-US" dirty="0"/>
-            </a:p>
-            <a:p>
-              <a:pPr algn="ctr"/>
-              <a:endParaRPr lang="en-US" dirty="0"/>
-            </a:p>
-            <a:p>
-              <a:pPr algn="ctr"/>
-              <a:endParaRPr lang="en-US" dirty="0"/>
-            </a:p>
-            <a:p>
-              <a:pPr algn="ctr"/>
-              <a:endParaRPr lang="en-US" dirty="0"/>
-            </a:p>
-            <a:p>
-              <a:pPr algn="ctr"/>
-              <a:endParaRPr lang="en-US" dirty="0"/>
-            </a:p>
-            <a:p>
-              <a:pPr algn="ctr"/>
-              <a:endParaRPr lang="en-US" dirty="0"/>
-            </a:p>
-            <a:p>
-              <a:pPr algn="ctr"/>
-              <a:endParaRPr lang="en-US" dirty="0"/>
-            </a:p>
-            <a:p>
-              <a:pPr algn="ctr"/>
-              <a:endParaRPr lang="en-US" dirty="0"/>
-            </a:p>
-            <a:p>
-              <a:pPr algn="ctr"/>
-              <a:r>
-                <a:rPr lang="en-US" dirty="0"/>
-                <a:t>+</a:t>
-              </a:r>
-            </a:p>
-            <a:p>
-              <a:pPr algn="ctr"/>
-              <a:endParaRPr lang="en-US" dirty="0"/>
-            </a:p>
-          </p:txBody>
-        </p:sp>
-        <p:sp>
-          <p:nvSpPr>
-            <p:cNvPr id="34" name="Rectangle 33">
-              <a:extLst>
-                <a:ext uri="{FF2B5EF4-FFF2-40B4-BE49-F238E27FC236}">
-                  <a16:creationId xmlns:a16="http://schemas.microsoft.com/office/drawing/2014/main" id="{97CAE694-E5D7-45D8-80CE-4067B6610E53}"/>
-                </a:ext>
-              </a:extLst>
-            </p:cNvPr>
-            <p:cNvSpPr/>
-            <p:nvPr userDrawn="1"/>
-          </p:nvSpPr>
-          <p:spPr>
-            <a:xfrm>
-              <a:off x="252031" y="655467"/>
-              <a:ext cx="6475341" cy="5701790"/>
-            </a:xfrm>
-            <a:prstGeom prst="rect">
-              <a:avLst/>
-            </a:prstGeom>
-            <a:solidFill>
-              <a:schemeClr val="bg1"/>
-            </a:solidFill>
-            <a:ln>
-              <a:noFill/>
-            </a:ln>
-          </p:spPr>
-          <p:style>
-            <a:lnRef idx="2">
-              <a:schemeClr val="accent1">
-                <a:shade val="50000"/>
-              </a:schemeClr>
-            </a:lnRef>
-            <a:fillRef idx="1">
-              <a:schemeClr val="accent1"/>
-            </a:fillRef>
-            <a:effectRef idx="0">
-              <a:schemeClr val="accent1"/>
-            </a:effectRef>
-            <a:fontRef idx="minor">
-              <a:schemeClr val="lt1"/>
-            </a:fontRef>
-          </p:style>
-          <p:txBody>
-            <a:bodyPr rtlCol="0" anchor="ctr"/>
-            <a:lstStyle/>
-            <a:p>
-              <a:pPr algn="ctr"/>
-              <a:endParaRPr lang="en-US" dirty="0"/>
-            </a:p>
-          </p:txBody>
-        </p:sp>
-      </p:grpSp>
-      <p:sp>
-        <p:nvSpPr>
-          <p:cNvPr id="7" name="Title 6">
-            <a:extLst>
-              <a:ext uri="{FF2B5EF4-FFF2-40B4-BE49-F238E27FC236}">
-                <a16:creationId xmlns:a16="http://schemas.microsoft.com/office/drawing/2014/main" id="{D5445F47-6D74-450C-BC16-998D2021AD78}"/>
-              </a:ext>
-            </a:extLst>
-          </p:cNvPr>
-          <p:cNvSpPr>
-            <a:spLocks noGrp="1"/>
-          </p:cNvSpPr>
-          <p:nvPr>
-            <p:ph type="title"/>
-          </p:nvPr>
-        </p:nvSpPr>
-        <p:spPr/>
-        <p:txBody>
-          <a:bodyPr/>
-          <a:lstStyle/>
-          <a:p>
-            <a:r>
-              <a:rPr lang="en-US" dirty="0"/>
-              <a:t>PORTFOLIO SUITABILITY APP</a:t>
-            </a:r>
-          </a:p>
-        </p:txBody>
-      </p:sp>
-      <p:sp>
-        <p:nvSpPr>
-          <p:cNvPr id="9" name="Text Placeholder 8">
-            <a:extLst>
-              <a:ext uri="{FF2B5EF4-FFF2-40B4-BE49-F238E27FC236}">
-                <a16:creationId xmlns:a16="http://schemas.microsoft.com/office/drawing/2014/main" id="{4744B28E-5E14-4A77-AD4F-C979905862BF}"/>
-              </a:ext>
-            </a:extLst>
-          </p:cNvPr>
-          <p:cNvSpPr>
-            <a:spLocks noGrp="1"/>
-          </p:cNvSpPr>
-          <p:nvPr>
-            <p:ph type="body" idx="13"/>
-          </p:nvPr>
-        </p:nvSpPr>
-        <p:spPr>
-          <a:xfrm>
-            <a:off x="6547865" y="1497308"/>
-            <a:ext cx="3883398" cy="696829"/>
-          </a:xfrm>
-        </p:spPr>
-        <p:txBody>
-          <a:bodyPr/>
-          <a:lstStyle/>
-          <a:p>
-            <a:pPr algn="ctr"/>
-            <a:r>
-              <a:rPr lang="en-US" dirty="0"/>
-              <a:t>ATTRACT CLIENTS WITH A FREE REPORT</a:t>
-            </a:r>
-          </a:p>
-        </p:txBody>
-      </p:sp>
-      <p:sp>
-        <p:nvSpPr>
-          <p:cNvPr id="4" name="Content Placeholder 3">
-            <a:extLst>
-              <a:ext uri="{FF2B5EF4-FFF2-40B4-BE49-F238E27FC236}">
-                <a16:creationId xmlns:a16="http://schemas.microsoft.com/office/drawing/2014/main" id="{2885A4AC-9AA0-4EFF-8162-609223BF5D70}"/>
-              </a:ext>
-            </a:extLst>
-          </p:cNvPr>
-          <p:cNvSpPr>
-            <a:spLocks noGrp="1"/>
-          </p:cNvSpPr>
-          <p:nvPr>
-            <p:ph idx="1"/>
-          </p:nvPr>
-        </p:nvSpPr>
-        <p:spPr>
-          <a:xfrm>
-            <a:off x="5510539" y="2957282"/>
-            <a:ext cx="6117771" cy="1938047"/>
-          </a:xfrm>
-        </p:spPr>
-        <p:txBody>
-          <a:bodyPr>
-            <a:normAutofit fontScale="92500"/>
-          </a:bodyPr>
-          <a:lstStyle/>
-          <a:p>
-            <a:pPr marL="0" indent="0">
-              <a:buNone/>
-            </a:pPr>
-            <a:r>
-              <a:rPr lang="en-US" dirty="0"/>
-              <a:t>The marketing rule of reciprocity shows that you can attract new clients by giving them something for free. This app allows you to build a portfolio of ETFs based on a potential client’s risk tolerance and investing goals. Use the pdf report to show how you can customize a portfolio to fit their risk tolerance and how that compares to common benchmarks like the S&amp;P 500.</a:t>
-            </a:r>
-          </a:p>
-        </p:txBody>
-      </p:sp>
-      <p:sp>
-        <p:nvSpPr>
-          <p:cNvPr id="11" name="Rectangle: Single Corner Snipped 10">
-            <a:extLst>
-              <a:ext uri="{FF2B5EF4-FFF2-40B4-BE49-F238E27FC236}">
-                <a16:creationId xmlns:a16="http://schemas.microsoft.com/office/drawing/2014/main" id="{851F9C8F-B284-4FE9-A76C-49BE3BEE3853}"/>
-              </a:ext>
-              <a:ext uri="{C183D7F6-B498-43B3-948B-1728B52AA6E4}">
-                <adec:decorative xmlns:adec="http://schemas.microsoft.com/office/drawing/2017/decorative" val="1"/>
-              </a:ext>
-            </a:extLst>
-          </p:cNvPr>
-          <p:cNvSpPr/>
-          <p:nvPr/>
-        </p:nvSpPr>
-        <p:spPr>
-          <a:xfrm flipH="1">
-            <a:off x="11549269" y="6356350"/>
-            <a:ext cx="642731" cy="501650"/>
-          </a:xfrm>
-          <a:prstGeom prst="snip1Rect">
-            <a:avLst/>
-          </a:prstGeom>
-          <a:solidFill>
-            <a:srgbClr val="2F3342"/>
-          </a:solidFill>
-          <a:ln>
-            <a:noFill/>
-          </a:ln>
-        </p:spPr>
-        <p:style>
-          <a:lnRef idx="2">
-            <a:schemeClr val="accent1">
-              <a:shade val="50000"/>
-            </a:schemeClr>
-          </a:lnRef>
-          <a:fillRef idx="1">
-            <a:schemeClr val="accent1"/>
-          </a:fillRef>
-          <a:effectRef idx="0">
-            <a:schemeClr val="accent1"/>
-          </a:effectRef>
-          <a:fontRef idx="minor">
-            <a:schemeClr val="lt1"/>
-          </a:fontRef>
-        </p:style>
-        <p:txBody>
-          <a:bodyPr rtlCol="0" anchor="ctr"/>
-          <a:lstStyle/>
-          <a:p>
-            <a:pPr algn="ctr"/>
-            <a:endParaRPr lang="en-US" dirty="0"/>
-          </a:p>
-        </p:txBody>
-      </p:sp>
-      <p:sp>
-        <p:nvSpPr>
-          <p:cNvPr id="12" name="Slide Number Placeholder 5">
-            <a:extLst>
-              <a:ext uri="{FF2B5EF4-FFF2-40B4-BE49-F238E27FC236}">
-                <a16:creationId xmlns:a16="http://schemas.microsoft.com/office/drawing/2014/main" id="{75EF0122-21C6-4139-B8D0-688B2553C487}"/>
-              </a:ext>
-            </a:extLst>
-          </p:cNvPr>
-          <p:cNvSpPr>
-            <a:spLocks noGrp="1"/>
-          </p:cNvSpPr>
-          <p:nvPr>
-            <p:ph type="sldNum" sz="quarter" idx="17"/>
-          </p:nvPr>
-        </p:nvSpPr>
-        <p:spPr>
-          <a:xfrm>
-            <a:off x="11549268" y="6413649"/>
-            <a:ext cx="642731" cy="407804"/>
-          </a:xfrm>
-          <a:prstGeom prst="rect">
-            <a:avLst/>
-          </a:prstGeom>
-        </p:spPr>
-        <p:txBody>
-          <a:bodyPr vert="horz" lIns="91440" tIns="45720" rIns="91440" bIns="45720" rtlCol="0" anchor="ctr"/>
-          <a:lstStyle>
-            <a:lvl1pPr algn="ctr">
-              <a:defRPr sz="1200">
-                <a:solidFill>
-                  <a:schemeClr val="bg1"/>
-                </a:solidFill>
-              </a:defRPr>
-            </a:lvl1pPr>
-          </a:lstStyle>
-          <a:p>
-            <a:fld id="{8C2E478F-E849-4A8C-AF1F-CBCC78A7CBFA}" type="slidenum">
-              <a:rPr lang="en-US" smtClean="0"/>
-              <a:pPr/>
-              <a:t>2</a:t>
-            </a:fld>
-            <a:endParaRPr lang="en-US" dirty="0"/>
-          </a:p>
-        </p:txBody>
-      </p:sp>
-      <p:pic>
-        <p:nvPicPr>
-          <p:cNvPr id="13" name="Picture 12">
-            <a:extLst>
-              <a:ext uri="{FF2B5EF4-FFF2-40B4-BE49-F238E27FC236}">
-                <a16:creationId xmlns:a16="http://schemas.microsoft.com/office/drawing/2014/main" id="{45D1FB63-27D7-4E49-B69D-2E329333B015}"/>
-              </a:ext>
-            </a:extLst>
-          </p:cNvPr>
-          <p:cNvPicPr>
-            <a:picLocks noChangeAspect="1"/>
-          </p:cNvPicPr>
-          <p:nvPr/>
-        </p:nvPicPr>
-        <p:blipFill>
-          <a:blip r:embed="rId4"/>
-          <a:stretch>
-            <a:fillRect/>
-          </a:stretch>
-        </p:blipFill>
-        <p:spPr>
-          <a:xfrm>
-            <a:off x="109845" y="55261"/>
-            <a:ext cx="969348" cy="1066892"/>
-          </a:xfrm>
-          <a:prstGeom prst="rect">
-            <a:avLst/>
-          </a:prstGeom>
-        </p:spPr>
-      </p:pic>
-    </p:spTree>
-    <p:extLst>
-      <p:ext uri="{BB962C8B-B14F-4D97-AF65-F5344CB8AC3E}">
-        <p14:creationId xmlns:p14="http://schemas.microsoft.com/office/powerpoint/2010/main" val="259734590"/>
-      </p:ext>
-    </p:extLst>
-  </p:cSld>
-  <p:clrMapOvr>
-    <a:masterClrMapping/>
-  </p:clrMapOvr>
-</p:sld>
-</file>
-
-<file path=ppt/slides/slide20.xml><?xml version="1.0" encoding="utf-8"?>
+<file path=ppt/slides/slide21.xml><?xml version="1.0" encoding="utf-8"?>
 <p:sld xmlns:a="http://schemas.openxmlformats.org/drawingml/2006/main" xmlns:r="http://schemas.openxmlformats.org/officeDocument/2006/relationships" xmlns:p="http://schemas.openxmlformats.org/presentationml/2006/main">
   <p:cSld>
     <p:spTree>
@@ -25882,7 +26055,7 @@
             <a:fld id="{8C2E478F-E849-4A8C-AF1F-CBCC78A7CBFA}" type="slidenum">
               <a:rPr lang="en-US" smtClean="0"/>
               <a:pPr/>
-              <a:t>20</a:t>
+              <a:t>21</a:t>
             </a:fld>
             <a:endParaRPr lang="en-US" dirty="0"/>
           </a:p>
@@ -25901,7 +26074,7 @@
 </p:sld>
 </file>
 
-<file path=ppt/slides/slide21.xml><?xml version="1.0" encoding="utf-8"?>
+<file path=ppt/slides/slide22.xml><?xml version="1.0" encoding="utf-8"?>
 <p:sld xmlns:a="http://schemas.openxmlformats.org/drawingml/2006/main" xmlns:r="http://schemas.openxmlformats.org/officeDocument/2006/relationships" xmlns:p="http://schemas.openxmlformats.org/presentationml/2006/main">
   <p:cSld>
     <p:bg>
@@ -26910,7 +27083,7 @@
             <a:fld id="{8C2E478F-E849-4A8C-AF1F-CBCC78A7CBFA}" type="slidenum">
               <a:rPr lang="en-US" smtClean="0"/>
               <a:pPr/>
-              <a:t>21</a:t>
+              <a:t>22</a:t>
             </a:fld>
             <a:endParaRPr lang="en-US" dirty="0"/>
           </a:p>
@@ -26929,7 +27102,7 @@
 </p:sld>
 </file>
 
-<file path=ppt/slides/slide22.xml><?xml version="1.0" encoding="utf-8"?>
+<file path=ppt/slides/slide23.xml><?xml version="1.0" encoding="utf-8"?>
 <p:sld xmlns:a="http://schemas.openxmlformats.org/drawingml/2006/main" xmlns:r="http://schemas.openxmlformats.org/officeDocument/2006/relationships" xmlns:p="http://schemas.openxmlformats.org/presentationml/2006/main">
   <p:cSld>
     <p:spTree>
@@ -27039,7 +27212,7 @@
             <a:fld id="{8C2E478F-E849-4A8C-AF1F-CBCC78A7CBFA}" type="slidenum">
               <a:rPr lang="en-US" smtClean="0"/>
               <a:pPr/>
-              <a:t>22</a:t>
+              <a:t>23</a:t>
             </a:fld>
             <a:endParaRPr lang="en-US" dirty="0"/>
           </a:p>
@@ -27059,259 +27232,6 @@
 </file>
 
 <file path=ppt/slides/slide3.xml><?xml version="1.0" encoding="utf-8"?>
-<p:sld xmlns:a="http://schemas.openxmlformats.org/drawingml/2006/main" xmlns:r="http://schemas.openxmlformats.org/officeDocument/2006/relationships" xmlns:p="http://schemas.openxmlformats.org/presentationml/2006/main">
-  <p:cSld>
-    <p:spTree>
-      <p:nvGrpSpPr>
-        <p:cNvPr id="1" name=""/>
-        <p:cNvGrpSpPr/>
-        <p:nvPr/>
-      </p:nvGrpSpPr>
-      <p:grpSpPr>
-        <a:xfrm>
-          <a:off x="0" y="0"/>
-          <a:ext cx="0" cy="0"/>
-          <a:chOff x="0" y="0"/>
-          <a:chExt cx="0" cy="0"/>
-        </a:xfrm>
-      </p:grpSpPr>
-      <p:sp>
-        <p:nvSpPr>
-          <p:cNvPr id="2" name="Title 1">
-            <a:extLst>
-              <a:ext uri="{FF2B5EF4-FFF2-40B4-BE49-F238E27FC236}">
-                <a16:creationId xmlns:a16="http://schemas.microsoft.com/office/drawing/2014/main" id="{8F1D5BE7-C36F-4E21-A63C-E9B442D1114F}"/>
-              </a:ext>
-            </a:extLst>
-          </p:cNvPr>
-          <p:cNvSpPr>
-            <a:spLocks noGrp="1"/>
-          </p:cNvSpPr>
-          <p:nvPr>
-            <p:ph type="title"/>
-          </p:nvPr>
-        </p:nvSpPr>
-        <p:spPr/>
-        <p:txBody>
-          <a:bodyPr>
-            <a:normAutofit/>
-          </a:bodyPr>
-          <a:lstStyle/>
-          <a:p>
-            <a:r>
-              <a:rPr lang="en-US" dirty="0"/>
-              <a:t>FEATURES</a:t>
-            </a:r>
-          </a:p>
-        </p:txBody>
-      </p:sp>
-      <p:sp>
-        <p:nvSpPr>
-          <p:cNvPr id="3" name="Footer Placeholder 2">
-            <a:extLst>
-              <a:ext uri="{FF2B5EF4-FFF2-40B4-BE49-F238E27FC236}">
-                <a16:creationId xmlns:a16="http://schemas.microsoft.com/office/drawing/2014/main" id="{B7C20DAC-9DB6-4515-971B-9D850CF7815D}"/>
-              </a:ext>
-            </a:extLst>
-          </p:cNvPr>
-          <p:cNvSpPr>
-            <a:spLocks noGrp="1"/>
-          </p:cNvSpPr>
-          <p:nvPr>
-            <p:ph type="ftr" sz="quarter" idx="10"/>
-          </p:nvPr>
-        </p:nvSpPr>
-        <p:spPr/>
-        <p:txBody>
-          <a:bodyPr/>
-          <a:lstStyle/>
-          <a:p>
-            <a:r>
-              <a:rPr lang="en-US"/>
-              <a:t>Add a Footer</a:t>
-            </a:r>
-            <a:endParaRPr lang="en-US" dirty="0"/>
-          </a:p>
-        </p:txBody>
-      </p:sp>
-      <p:sp>
-        <p:nvSpPr>
-          <p:cNvPr id="4" name="Slide Number Placeholder 3">
-            <a:extLst>
-              <a:ext uri="{FF2B5EF4-FFF2-40B4-BE49-F238E27FC236}">
-                <a16:creationId xmlns:a16="http://schemas.microsoft.com/office/drawing/2014/main" id="{C94957B4-5AE9-4220-87B6-BBB66AC0E59C}"/>
-              </a:ext>
-            </a:extLst>
-          </p:cNvPr>
-          <p:cNvSpPr>
-            <a:spLocks noGrp="1"/>
-          </p:cNvSpPr>
-          <p:nvPr>
-            <p:ph type="sldNum" sz="quarter" idx="11"/>
-          </p:nvPr>
-        </p:nvSpPr>
-        <p:spPr/>
-        <p:txBody>
-          <a:bodyPr/>
-          <a:lstStyle/>
-          <a:p>
-            <a:fld id="{8C2E478F-E849-4A8C-AF1F-CBCC78A7CBFA}" type="slidenum">
-              <a:rPr lang="en-US" smtClean="0"/>
-              <a:pPr/>
-              <a:t>3</a:t>
-            </a:fld>
-            <a:endParaRPr lang="en-US" dirty="0"/>
-          </a:p>
-        </p:txBody>
-      </p:sp>
-      <p:sp>
-        <p:nvSpPr>
-          <p:cNvPr id="5" name="Content Placeholder 4">
-            <a:extLst>
-              <a:ext uri="{FF2B5EF4-FFF2-40B4-BE49-F238E27FC236}">
-                <a16:creationId xmlns:a16="http://schemas.microsoft.com/office/drawing/2014/main" id="{E742D916-2B17-43E6-8709-D29220B8204C}"/>
-              </a:ext>
-            </a:extLst>
-          </p:cNvPr>
-          <p:cNvSpPr>
-            <a:spLocks noGrp="1"/>
-          </p:cNvSpPr>
-          <p:nvPr>
-            <p:ph idx="1"/>
-          </p:nvPr>
-        </p:nvSpPr>
-        <p:spPr/>
-        <p:txBody>
-          <a:bodyPr>
-            <a:noAutofit/>
-          </a:bodyPr>
-          <a:lstStyle/>
-          <a:p>
-            <a:r>
-              <a:rPr lang="en-US" sz="1800" dirty="0"/>
-              <a:t>As a financial advisor, use this app to attract new clients by offering them something of value and creating reciprocity</a:t>
-            </a:r>
-          </a:p>
-          <a:p>
-            <a:r>
-              <a:rPr lang="en-US" sz="1800" dirty="0"/>
-              <a:t>The app provides simple ETF investment recommendations that you can build on to create a more customized portfolio  once the client signs on with you</a:t>
-            </a:r>
-          </a:p>
-          <a:p>
-            <a:r>
-              <a:rPr lang="en-US" sz="1800" dirty="0"/>
-              <a:t>The app:</a:t>
-            </a:r>
-          </a:p>
-          <a:p>
-            <a:pPr lvl="1"/>
-            <a:r>
-              <a:rPr lang="en-US" sz="1800" dirty="0"/>
-              <a:t> Collects data from the potential client</a:t>
-            </a:r>
-          </a:p>
-          <a:p>
-            <a:pPr lvl="1"/>
-            <a:r>
-              <a:rPr lang="en-US" sz="1800" dirty="0"/>
-              <a:t> Translates data into a risk score</a:t>
-            </a:r>
-          </a:p>
-          <a:p>
-            <a:pPr lvl="1"/>
-            <a:r>
-              <a:rPr lang="en-US" sz="1800" dirty="0"/>
-              <a:t>Uses the client information and risk score to recommend a portfolio of ETFs</a:t>
-            </a:r>
-          </a:p>
-          <a:p>
-            <a:pPr lvl="1"/>
-            <a:r>
-              <a:rPr lang="en-US" sz="1800" dirty="0"/>
-              <a:t>Generates graphs to show how the recommended portfolio compares to portfolios with other levels of risk and benchmarks like the S&amp;P500</a:t>
-            </a:r>
-          </a:p>
-          <a:p>
-            <a:pPr lvl="1"/>
-            <a:r>
-              <a:rPr lang="en-US" sz="1800" dirty="0"/>
-              <a:t>Outputs a pdf of the graphical results that can be shared with the potential client</a:t>
-            </a:r>
-          </a:p>
-          <a:p>
-            <a:r>
-              <a:rPr lang="en-US" sz="1800" dirty="0"/>
-              <a:t>The app is answering these three questions:</a:t>
-            </a:r>
-          </a:p>
-          <a:p>
-            <a:pPr lvl="1"/>
-            <a:r>
-              <a:rPr lang="en-US" sz="1400" dirty="0"/>
-              <a:t>1. Which criteria are important in determining portfolio suitability?</a:t>
-            </a:r>
-          </a:p>
-          <a:p>
-            <a:pPr lvl="1"/>
-            <a:r>
-              <a:rPr lang="en-US" sz="1400" dirty="0"/>
-              <a:t>2. Which stock portfolios are best suited for each type of investor?</a:t>
-            </a:r>
-          </a:p>
-          <a:p>
-            <a:pPr lvl="1"/>
-            <a:r>
-              <a:rPr lang="en-US" sz="1400" dirty="0"/>
-              <a:t>3. How are these different types of portfolios likely to perform compared to benchmarks?</a:t>
-            </a:r>
-          </a:p>
-        </p:txBody>
-      </p:sp>
-      <p:pic>
-        <p:nvPicPr>
-          <p:cNvPr id="6" name="Picture 5">
-            <a:extLst>
-              <a:ext uri="{FF2B5EF4-FFF2-40B4-BE49-F238E27FC236}">
-                <a16:creationId xmlns:a16="http://schemas.microsoft.com/office/drawing/2014/main" id="{B26B8433-6A5B-4A87-849E-2B13FCA1C343}"/>
-              </a:ext>
-            </a:extLst>
-          </p:cNvPr>
-          <p:cNvPicPr>
-            <a:picLocks noChangeAspect="1"/>
-          </p:cNvPicPr>
-          <p:nvPr/>
-        </p:nvPicPr>
-        <p:blipFill>
-          <a:blip r:embed="rId2"/>
-          <a:stretch>
-            <a:fillRect/>
-          </a:stretch>
-        </p:blipFill>
-        <p:spPr>
-          <a:xfrm>
-            <a:off x="109845" y="61073"/>
-            <a:ext cx="969348" cy="1066892"/>
-          </a:xfrm>
-          <a:prstGeom prst="rect">
-            <a:avLst/>
-          </a:prstGeom>
-        </p:spPr>
-      </p:pic>
-    </p:spTree>
-    <p:extLst>
-      <p:ext uri="{BB962C8B-B14F-4D97-AF65-F5344CB8AC3E}">
-        <p14:creationId xmlns:p14="http://schemas.microsoft.com/office/powerpoint/2010/main" val="3102118612"/>
-      </p:ext>
-    </p:extLst>
-  </p:cSld>
-  <p:clrMapOvr>
-    <a:masterClrMapping/>
-  </p:clrMapOvr>
-</p:sld>
-</file>
-
-<file path=ppt/slides/slide4.xml><?xml version="1.0" encoding="utf-8"?>
 <p:sld xmlns:a="http://schemas.openxmlformats.org/drawingml/2006/main" xmlns:r="http://schemas.openxmlformats.org/officeDocument/2006/relationships" xmlns:p="http://schemas.openxmlformats.org/presentationml/2006/main">
   <p:cSld>
     <p:spTree>
@@ -27381,7 +27301,7 @@
             <a:fld id="{8C2E478F-E849-4A8C-AF1F-CBCC78A7CBFA}" type="slidenum">
               <a:rPr lang="en-US" smtClean="0"/>
               <a:pPr/>
-              <a:t>4</a:t>
+              <a:t>3</a:t>
             </a:fld>
             <a:endParaRPr lang="en-US" dirty="0"/>
           </a:p>
@@ -27690,6 +27610,259 @@
     <p:extLst>
       <p:ext uri="{BB962C8B-B14F-4D97-AF65-F5344CB8AC3E}">
         <p14:creationId xmlns:p14="http://schemas.microsoft.com/office/powerpoint/2010/main" val="2424735460"/>
+      </p:ext>
+    </p:extLst>
+  </p:cSld>
+  <p:clrMapOvr>
+    <a:masterClrMapping/>
+  </p:clrMapOvr>
+</p:sld>
+</file>
+
+<file path=ppt/slides/slide4.xml><?xml version="1.0" encoding="utf-8"?>
+<p:sld xmlns:a="http://schemas.openxmlformats.org/drawingml/2006/main" xmlns:r="http://schemas.openxmlformats.org/officeDocument/2006/relationships" xmlns:p="http://schemas.openxmlformats.org/presentationml/2006/main">
+  <p:cSld>
+    <p:spTree>
+      <p:nvGrpSpPr>
+        <p:cNvPr id="1" name=""/>
+        <p:cNvGrpSpPr/>
+        <p:nvPr/>
+      </p:nvGrpSpPr>
+      <p:grpSpPr>
+        <a:xfrm>
+          <a:off x="0" y="0"/>
+          <a:ext cx="0" cy="0"/>
+          <a:chOff x="0" y="0"/>
+          <a:chExt cx="0" cy="0"/>
+        </a:xfrm>
+      </p:grpSpPr>
+      <p:sp>
+        <p:nvSpPr>
+          <p:cNvPr id="2" name="Title 1">
+            <a:extLst>
+              <a:ext uri="{FF2B5EF4-FFF2-40B4-BE49-F238E27FC236}">
+                <a16:creationId xmlns:a16="http://schemas.microsoft.com/office/drawing/2014/main" id="{8F1D5BE7-C36F-4E21-A63C-E9B442D1114F}"/>
+              </a:ext>
+            </a:extLst>
+          </p:cNvPr>
+          <p:cNvSpPr>
+            <a:spLocks noGrp="1"/>
+          </p:cNvSpPr>
+          <p:nvPr>
+            <p:ph type="title"/>
+          </p:nvPr>
+        </p:nvSpPr>
+        <p:spPr/>
+        <p:txBody>
+          <a:bodyPr>
+            <a:normAutofit/>
+          </a:bodyPr>
+          <a:lstStyle/>
+          <a:p>
+            <a:r>
+              <a:rPr lang="en-US" dirty="0"/>
+              <a:t>FEATURES</a:t>
+            </a:r>
+          </a:p>
+        </p:txBody>
+      </p:sp>
+      <p:sp>
+        <p:nvSpPr>
+          <p:cNvPr id="3" name="Footer Placeholder 2">
+            <a:extLst>
+              <a:ext uri="{FF2B5EF4-FFF2-40B4-BE49-F238E27FC236}">
+                <a16:creationId xmlns:a16="http://schemas.microsoft.com/office/drawing/2014/main" id="{B7C20DAC-9DB6-4515-971B-9D850CF7815D}"/>
+              </a:ext>
+            </a:extLst>
+          </p:cNvPr>
+          <p:cNvSpPr>
+            <a:spLocks noGrp="1"/>
+          </p:cNvSpPr>
+          <p:nvPr>
+            <p:ph type="ftr" sz="quarter" idx="10"/>
+          </p:nvPr>
+        </p:nvSpPr>
+        <p:spPr/>
+        <p:txBody>
+          <a:bodyPr/>
+          <a:lstStyle/>
+          <a:p>
+            <a:r>
+              <a:rPr lang="en-US"/>
+              <a:t>Add a Footer</a:t>
+            </a:r>
+            <a:endParaRPr lang="en-US" dirty="0"/>
+          </a:p>
+        </p:txBody>
+      </p:sp>
+      <p:sp>
+        <p:nvSpPr>
+          <p:cNvPr id="4" name="Slide Number Placeholder 3">
+            <a:extLst>
+              <a:ext uri="{FF2B5EF4-FFF2-40B4-BE49-F238E27FC236}">
+                <a16:creationId xmlns:a16="http://schemas.microsoft.com/office/drawing/2014/main" id="{C94957B4-5AE9-4220-87B6-BBB66AC0E59C}"/>
+              </a:ext>
+            </a:extLst>
+          </p:cNvPr>
+          <p:cNvSpPr>
+            <a:spLocks noGrp="1"/>
+          </p:cNvSpPr>
+          <p:nvPr>
+            <p:ph type="sldNum" sz="quarter" idx="11"/>
+          </p:nvPr>
+        </p:nvSpPr>
+        <p:spPr/>
+        <p:txBody>
+          <a:bodyPr/>
+          <a:lstStyle/>
+          <a:p>
+            <a:fld id="{8C2E478F-E849-4A8C-AF1F-CBCC78A7CBFA}" type="slidenum">
+              <a:rPr lang="en-US" smtClean="0"/>
+              <a:pPr/>
+              <a:t>4</a:t>
+            </a:fld>
+            <a:endParaRPr lang="en-US" dirty="0"/>
+          </a:p>
+        </p:txBody>
+      </p:sp>
+      <p:sp>
+        <p:nvSpPr>
+          <p:cNvPr id="5" name="Content Placeholder 4">
+            <a:extLst>
+              <a:ext uri="{FF2B5EF4-FFF2-40B4-BE49-F238E27FC236}">
+                <a16:creationId xmlns:a16="http://schemas.microsoft.com/office/drawing/2014/main" id="{E742D916-2B17-43E6-8709-D29220B8204C}"/>
+              </a:ext>
+            </a:extLst>
+          </p:cNvPr>
+          <p:cNvSpPr>
+            <a:spLocks noGrp="1"/>
+          </p:cNvSpPr>
+          <p:nvPr>
+            <p:ph idx="1"/>
+          </p:nvPr>
+        </p:nvSpPr>
+        <p:spPr/>
+        <p:txBody>
+          <a:bodyPr>
+            <a:noAutofit/>
+          </a:bodyPr>
+          <a:lstStyle/>
+          <a:p>
+            <a:r>
+              <a:rPr lang="en-US" sz="1800" dirty="0"/>
+              <a:t>As a financial advisor, use this app to attract new clients by offering them something of value and creating reciprocity</a:t>
+            </a:r>
+          </a:p>
+          <a:p>
+            <a:r>
+              <a:rPr lang="en-US" sz="1800" dirty="0"/>
+              <a:t>The app provides simple ETF investment recommendations that you can build on to create a more customized portfolio  once the client signs on with you</a:t>
+            </a:r>
+          </a:p>
+          <a:p>
+            <a:r>
+              <a:rPr lang="en-US" sz="1800" dirty="0"/>
+              <a:t>The app:</a:t>
+            </a:r>
+          </a:p>
+          <a:p>
+            <a:pPr lvl="1"/>
+            <a:r>
+              <a:rPr lang="en-US" sz="1800" dirty="0"/>
+              <a:t> Collects data from the potential client</a:t>
+            </a:r>
+          </a:p>
+          <a:p>
+            <a:pPr lvl="1"/>
+            <a:r>
+              <a:rPr lang="en-US" sz="1800" dirty="0"/>
+              <a:t> Translates data into a risk score</a:t>
+            </a:r>
+          </a:p>
+          <a:p>
+            <a:pPr lvl="1"/>
+            <a:r>
+              <a:rPr lang="en-US" sz="1800" dirty="0"/>
+              <a:t>Uses the client information and risk score to recommend a portfolio of ETFs</a:t>
+            </a:r>
+          </a:p>
+          <a:p>
+            <a:pPr lvl="1"/>
+            <a:r>
+              <a:rPr lang="en-US" sz="1800" dirty="0"/>
+              <a:t>Generates graphs to show how the recommended portfolio compares to portfolios with other levels of risk and benchmarks like the S&amp;P500</a:t>
+            </a:r>
+          </a:p>
+          <a:p>
+            <a:pPr lvl="1"/>
+            <a:r>
+              <a:rPr lang="en-US" sz="1800" dirty="0"/>
+              <a:t>Outputs a pdf of the graphical results that can be shared with the potential client</a:t>
+            </a:r>
+          </a:p>
+          <a:p>
+            <a:r>
+              <a:rPr lang="en-US" sz="1800" dirty="0"/>
+              <a:t>The app is answering these three questions:</a:t>
+            </a:r>
+          </a:p>
+          <a:p>
+            <a:pPr lvl="1"/>
+            <a:r>
+              <a:rPr lang="en-US" sz="1400" dirty="0"/>
+              <a:t>1. Which criteria are important in determining portfolio suitability?</a:t>
+            </a:r>
+          </a:p>
+          <a:p>
+            <a:pPr lvl="1"/>
+            <a:r>
+              <a:rPr lang="en-US" sz="1400" dirty="0"/>
+              <a:t>2. Which ETFs are best suited for each type of investor?</a:t>
+            </a:r>
+          </a:p>
+          <a:p>
+            <a:pPr lvl="1"/>
+            <a:r>
+              <a:rPr lang="en-US" sz="1400" dirty="0"/>
+              <a:t>3. How are these different types of portfolios likely to perform compared to benchmarks?</a:t>
+            </a:r>
+          </a:p>
+        </p:txBody>
+      </p:sp>
+      <p:pic>
+        <p:nvPicPr>
+          <p:cNvPr id="6" name="Picture 5">
+            <a:extLst>
+              <a:ext uri="{FF2B5EF4-FFF2-40B4-BE49-F238E27FC236}">
+                <a16:creationId xmlns:a16="http://schemas.microsoft.com/office/drawing/2014/main" id="{B26B8433-6A5B-4A87-849E-2B13FCA1C343}"/>
+              </a:ext>
+            </a:extLst>
+          </p:cNvPr>
+          <p:cNvPicPr>
+            <a:picLocks noChangeAspect="1"/>
+          </p:cNvPicPr>
+          <p:nvPr/>
+        </p:nvPicPr>
+        <p:blipFill>
+          <a:blip r:embed="rId2"/>
+          <a:stretch>
+            <a:fillRect/>
+          </a:stretch>
+        </p:blipFill>
+        <p:spPr>
+          <a:xfrm>
+            <a:off x="109845" y="61073"/>
+            <a:ext cx="969348" cy="1066892"/>
+          </a:xfrm>
+          <a:prstGeom prst="rect">
+            <a:avLst/>
+          </a:prstGeom>
+        </p:spPr>
+      </p:pic>
+    </p:spTree>
+    <p:extLst>
+      <p:ext uri="{BB962C8B-B14F-4D97-AF65-F5344CB8AC3E}">
+        <p14:creationId xmlns:p14="http://schemas.microsoft.com/office/powerpoint/2010/main" val="3102118612"/>
       </p:ext>
     </p:extLst>
   </p:cSld>
@@ -28101,7 +28274,13 @@
           <a:bodyPr/>
           <a:lstStyle/>
           <a:p>
-            <a:endParaRPr lang="en-US"/>
+            <a:pPr marL="0" indent="0">
+              <a:buNone/>
+            </a:pPr>
+            <a:r>
+              <a:rPr lang="en-US" dirty="0"/>
+              <a:t>The app uses a simplified version of 6 profiles from RBC Wealth Management in their RBC Strategic Asset Allocation model</a:t>
+            </a:r>
           </a:p>
         </p:txBody>
       </p:sp>
@@ -28129,6 +28308,36 @@
           <a:xfrm>
             <a:off x="76713" y="61073"/>
             <a:ext cx="969348" cy="1066892"/>
+          </a:xfrm>
+          <a:prstGeom prst="rect">
+            <a:avLst/>
+          </a:prstGeom>
+        </p:spPr>
+      </p:pic>
+      <p:pic>
+        <p:nvPicPr>
+          <p:cNvPr id="8" name="Picture 7">
+            <a:extLst>
+              <a:ext uri="{FF2B5EF4-FFF2-40B4-BE49-F238E27FC236}">
+                <a16:creationId xmlns:a16="http://schemas.microsoft.com/office/drawing/2014/main" id="{BB2B281E-C0BF-472E-9C95-626D6AF38E82}"/>
+              </a:ext>
+            </a:extLst>
+          </p:cNvPr>
+          <p:cNvPicPr>
+            <a:picLocks noChangeAspect="1"/>
+          </p:cNvPicPr>
+          <p:nvPr/>
+        </p:nvPicPr>
+        <p:blipFill>
+          <a:blip r:embed="rId3"/>
+          <a:stretch>
+            <a:fillRect/>
+          </a:stretch>
+        </p:blipFill>
+        <p:spPr>
+          <a:xfrm>
+            <a:off x="1008396" y="2595404"/>
+            <a:ext cx="10058917" cy="3073558"/>
           </a:xfrm>
           <a:prstGeom prst="rect">
             <a:avLst/>
@@ -28188,7 +28397,7 @@
           <a:p>
             <a:r>
               <a:rPr lang="en-US" dirty="0"/>
-              <a:t>Risk measures</a:t>
+              <a:t>Portfolio construction</a:t>
             </a:r>
           </a:p>
         </p:txBody>
@@ -28277,9 +28486,21 @@
               <a:buNone/>
             </a:pPr>
             <a:r>
-              <a:rPr lang="en-US" dirty="0"/>
-              <a:t>The app calculates basic risk measures </a:t>
+              <a:rPr lang="en-US" sz="2000" dirty="0"/>
+              <a:t>The six profiles have been simplified and applied to ETF holdings based on the following percentages.</a:t>
             </a:r>
+          </a:p>
+          <a:p>
+            <a:pPr marL="0" indent="0">
+              <a:buNone/>
+            </a:pPr>
+            <a:endParaRPr lang="en-US" dirty="0"/>
+          </a:p>
+          <a:p>
+            <a:pPr marL="0" indent="0">
+              <a:buNone/>
+            </a:pPr>
+            <a:endParaRPr lang="en-US" dirty="0"/>
           </a:p>
         </p:txBody>
       </p:sp>
@@ -28288,7 +28509,7 @@
           <p:cNvPr id="6" name="Picture 5">
             <a:extLst>
               <a:ext uri="{FF2B5EF4-FFF2-40B4-BE49-F238E27FC236}">
-                <a16:creationId xmlns:a16="http://schemas.microsoft.com/office/drawing/2014/main" id="{38173E07-8BB9-43CE-B1BB-F68C4742EE04}"/>
+                <a16:creationId xmlns:a16="http://schemas.microsoft.com/office/drawing/2014/main" id="{1DB82C27-F9BA-4C54-8250-0A7BABF3F157}"/>
               </a:ext>
             </a:extLst>
           </p:cNvPr>
@@ -28305,7 +28526,7 @@
         </p:blipFill>
         <p:spPr>
           <a:xfrm>
-            <a:off x="109845" y="61073"/>
+            <a:off x="76713" y="61073"/>
             <a:ext cx="969348" cy="1066892"/>
           </a:xfrm>
           <a:prstGeom prst="rect">
@@ -28313,10 +28534,1033 @@
           </a:prstGeom>
         </p:spPr>
       </p:pic>
+      <p:graphicFrame>
+        <p:nvGraphicFramePr>
+          <p:cNvPr id="7" name="Table 8">
+            <a:extLst>
+              <a:ext uri="{FF2B5EF4-FFF2-40B4-BE49-F238E27FC236}">
+                <a16:creationId xmlns:a16="http://schemas.microsoft.com/office/drawing/2014/main" id="{DFF79F8D-8E63-4AD4-9018-8426247EE032}"/>
+              </a:ext>
+            </a:extLst>
+          </p:cNvPr>
+          <p:cNvGraphicFramePr>
+            <a:graphicFrameLocks noGrp="1"/>
+          </p:cNvGraphicFramePr>
+          <p:nvPr>
+            <p:extLst>
+              <p:ext uri="{D42A27DB-BD31-4B8C-83A1-F6EECF244321}">
+                <p14:modId xmlns:p14="http://schemas.microsoft.com/office/powerpoint/2010/main" val="3240511122"/>
+              </p:ext>
+            </p:extLst>
+          </p:nvPr>
+        </p:nvGraphicFramePr>
+        <p:xfrm>
+          <a:off x="2206171" y="1787842"/>
+          <a:ext cx="8128000" cy="3881120"/>
+        </p:xfrm>
+        <a:graphic>
+          <a:graphicData uri="http://schemas.openxmlformats.org/drawingml/2006/table">
+            <a:tbl>
+              <a:tblPr firstRow="1" bandRow="1">
+                <a:tableStyleId>{00A15C55-8517-42AA-B614-E9B94910E393}</a:tableStyleId>
+              </a:tblPr>
+              <a:tblGrid>
+                <a:gridCol w="1016000">
+                  <a:extLst>
+                    <a:ext uri="{9D8B030D-6E8A-4147-A177-3AD203B41FA5}">
+                      <a16:colId xmlns:a16="http://schemas.microsoft.com/office/drawing/2014/main" val="3980051804"/>
+                    </a:ext>
+                  </a:extLst>
+                </a:gridCol>
+                <a:gridCol w="1016000">
+                  <a:extLst>
+                    <a:ext uri="{9D8B030D-6E8A-4147-A177-3AD203B41FA5}">
+                      <a16:colId xmlns:a16="http://schemas.microsoft.com/office/drawing/2014/main" val="3379251033"/>
+                    </a:ext>
+                  </a:extLst>
+                </a:gridCol>
+                <a:gridCol w="1016000">
+                  <a:extLst>
+                    <a:ext uri="{9D8B030D-6E8A-4147-A177-3AD203B41FA5}">
+                      <a16:colId xmlns:a16="http://schemas.microsoft.com/office/drawing/2014/main" val="3920046003"/>
+                    </a:ext>
+                  </a:extLst>
+                </a:gridCol>
+                <a:gridCol w="1016000">
+                  <a:extLst>
+                    <a:ext uri="{9D8B030D-6E8A-4147-A177-3AD203B41FA5}">
+                      <a16:colId xmlns:a16="http://schemas.microsoft.com/office/drawing/2014/main" val="3984170608"/>
+                    </a:ext>
+                  </a:extLst>
+                </a:gridCol>
+                <a:gridCol w="1016000">
+                  <a:extLst>
+                    <a:ext uri="{9D8B030D-6E8A-4147-A177-3AD203B41FA5}">
+                      <a16:colId xmlns:a16="http://schemas.microsoft.com/office/drawing/2014/main" val="401991740"/>
+                    </a:ext>
+                  </a:extLst>
+                </a:gridCol>
+                <a:gridCol w="1016000">
+                  <a:extLst>
+                    <a:ext uri="{9D8B030D-6E8A-4147-A177-3AD203B41FA5}">
+                      <a16:colId xmlns:a16="http://schemas.microsoft.com/office/drawing/2014/main" val="2267246189"/>
+                    </a:ext>
+                  </a:extLst>
+                </a:gridCol>
+                <a:gridCol w="1016000">
+                  <a:extLst>
+                    <a:ext uri="{9D8B030D-6E8A-4147-A177-3AD203B41FA5}">
+                      <a16:colId xmlns:a16="http://schemas.microsoft.com/office/drawing/2014/main" val="2684587244"/>
+                    </a:ext>
+                  </a:extLst>
+                </a:gridCol>
+                <a:gridCol w="1016000">
+                  <a:extLst>
+                    <a:ext uri="{9D8B030D-6E8A-4147-A177-3AD203B41FA5}">
+                      <a16:colId xmlns:a16="http://schemas.microsoft.com/office/drawing/2014/main" val="11563535"/>
+                    </a:ext>
+                  </a:extLst>
+                </a:gridCol>
+              </a:tblGrid>
+              <a:tr h="370840">
+                <a:tc>
+                  <a:txBody>
+                    <a:bodyPr/>
+                    <a:lstStyle/>
+                    <a:p>
+                      <a:pPr algn="ctr"/>
+                      <a:r>
+                        <a:rPr lang="en-US" sz="1400" dirty="0"/>
+                        <a:t>Asset Class</a:t>
+                      </a:r>
+                    </a:p>
+                  </a:txBody>
+                  <a:tcPr anchor="ctr"/>
+                </a:tc>
+                <a:tc>
+                  <a:txBody>
+                    <a:bodyPr/>
+                    <a:lstStyle/>
+                    <a:p>
+                      <a:pPr algn="ctr"/>
+                      <a:r>
+                        <a:rPr lang="en-US" sz="1400" dirty="0"/>
+                        <a:t>ETFs</a:t>
+                      </a:r>
+                    </a:p>
+                  </a:txBody>
+                  <a:tcPr anchor="ctr"/>
+                </a:tc>
+                <a:tc>
+                  <a:txBody>
+                    <a:bodyPr/>
+                    <a:lstStyle/>
+                    <a:p>
+                      <a:pPr algn="ctr"/>
+                      <a:r>
+                        <a:rPr lang="en-US" sz="1400" dirty="0"/>
+                        <a:t>Profile 0</a:t>
+                      </a:r>
+                    </a:p>
+                    <a:p>
+                      <a:pPr algn="ctr"/>
+                      <a:r>
+                        <a:rPr lang="en-US" sz="1200" dirty="0"/>
+                        <a:t>Fixed Income</a:t>
+                      </a:r>
+                    </a:p>
+                  </a:txBody>
+                  <a:tcPr anchor="ctr"/>
+                </a:tc>
+                <a:tc>
+                  <a:txBody>
+                    <a:bodyPr/>
+                    <a:lstStyle/>
+                    <a:p>
+                      <a:pPr algn="ctr"/>
+                      <a:r>
+                        <a:rPr lang="en-US" sz="1400" dirty="0"/>
+                        <a:t>Profile 1</a:t>
+                      </a:r>
+                    </a:p>
+                  </a:txBody>
+                  <a:tcPr anchor="ctr"/>
+                </a:tc>
+                <a:tc>
+                  <a:txBody>
+                    <a:bodyPr/>
+                    <a:lstStyle/>
+                    <a:p>
+                      <a:pPr algn="ctr"/>
+                      <a:r>
+                        <a:rPr lang="en-US" sz="1400" dirty="0"/>
+                        <a:t>Profile 2</a:t>
+                      </a:r>
+                    </a:p>
+                  </a:txBody>
+                  <a:tcPr anchor="ctr"/>
+                </a:tc>
+                <a:tc>
+                  <a:txBody>
+                    <a:bodyPr/>
+                    <a:lstStyle/>
+                    <a:p>
+                      <a:pPr algn="ctr"/>
+                      <a:r>
+                        <a:rPr lang="en-US" sz="1400" dirty="0"/>
+                        <a:t>Profile 3</a:t>
+                      </a:r>
+                    </a:p>
+                  </a:txBody>
+                  <a:tcPr anchor="ctr"/>
+                </a:tc>
+                <a:tc>
+                  <a:txBody>
+                    <a:bodyPr/>
+                    <a:lstStyle/>
+                    <a:p>
+                      <a:pPr algn="ctr"/>
+                      <a:r>
+                        <a:rPr lang="en-US" sz="1400" dirty="0"/>
+                        <a:t>Profile 4</a:t>
+                      </a:r>
+                    </a:p>
+                  </a:txBody>
+                  <a:tcPr anchor="ctr"/>
+                </a:tc>
+                <a:tc>
+                  <a:txBody>
+                    <a:bodyPr/>
+                    <a:lstStyle/>
+                    <a:p>
+                      <a:pPr algn="ctr"/>
+                      <a:r>
+                        <a:rPr lang="en-US" sz="1400" dirty="0"/>
+                        <a:t>Profile 5</a:t>
+                      </a:r>
+                    </a:p>
+                    <a:p>
+                      <a:pPr algn="ctr"/>
+                      <a:r>
+                        <a:rPr lang="en-US" sz="1200" dirty="0"/>
+                        <a:t>Speculative</a:t>
+                      </a:r>
+                    </a:p>
+                  </a:txBody>
+                  <a:tcPr anchor="ctr"/>
+                </a:tc>
+                <a:extLst>
+                  <a:ext uri="{0D108BD9-81ED-4DB2-BD59-A6C34878D82A}">
+                    <a16:rowId xmlns:a16="http://schemas.microsoft.com/office/drawing/2014/main" val="4252818080"/>
+                  </a:ext>
+                </a:extLst>
+              </a:tr>
+              <a:tr h="370840">
+                <a:tc>
+                  <a:txBody>
+                    <a:bodyPr/>
+                    <a:lstStyle/>
+                    <a:p>
+                      <a:r>
+                        <a:rPr lang="en-US" sz="1200" dirty="0"/>
+                        <a:t>Cash &amp; Cash Alternatives</a:t>
+                      </a:r>
+                    </a:p>
+                  </a:txBody>
+                  <a:tcPr anchor="ctr"/>
+                </a:tc>
+                <a:tc>
+                  <a:txBody>
+                    <a:bodyPr/>
+                    <a:lstStyle/>
+                    <a:p>
+                      <a:endParaRPr lang="en-US" sz="1400" dirty="0"/>
+                    </a:p>
+                  </a:txBody>
+                  <a:tcPr anchor="ctr"/>
+                </a:tc>
+                <a:tc>
+                  <a:txBody>
+                    <a:bodyPr/>
+                    <a:lstStyle/>
+                    <a:p>
+                      <a:pPr algn="ctr"/>
+                      <a:r>
+                        <a:rPr lang="en-US" sz="1400" dirty="0"/>
+                        <a:t>2%</a:t>
+                      </a:r>
+                    </a:p>
+                  </a:txBody>
+                  <a:tcPr anchor="ctr"/>
+                </a:tc>
+                <a:tc>
+                  <a:txBody>
+                    <a:bodyPr/>
+                    <a:lstStyle/>
+                    <a:p>
+                      <a:pPr algn="ctr"/>
+                      <a:r>
+                        <a:rPr lang="en-US" sz="1400" dirty="0"/>
+                        <a:t>2%</a:t>
+                      </a:r>
+                    </a:p>
+                  </a:txBody>
+                  <a:tcPr anchor="ctr"/>
+                </a:tc>
+                <a:tc>
+                  <a:txBody>
+                    <a:bodyPr/>
+                    <a:lstStyle/>
+                    <a:p>
+                      <a:pPr algn="ctr"/>
+                      <a:r>
+                        <a:rPr lang="en-US" sz="1400" dirty="0"/>
+                        <a:t>2%</a:t>
+                      </a:r>
+                    </a:p>
+                  </a:txBody>
+                  <a:tcPr anchor="ctr"/>
+                </a:tc>
+                <a:tc>
+                  <a:txBody>
+                    <a:bodyPr/>
+                    <a:lstStyle/>
+                    <a:p>
+                      <a:pPr algn="ctr"/>
+                      <a:r>
+                        <a:rPr lang="en-US" sz="1400" dirty="0"/>
+                        <a:t>2%</a:t>
+                      </a:r>
+                    </a:p>
+                  </a:txBody>
+                  <a:tcPr anchor="ctr"/>
+                </a:tc>
+                <a:tc>
+                  <a:txBody>
+                    <a:bodyPr/>
+                    <a:lstStyle/>
+                    <a:p>
+                      <a:pPr algn="ctr"/>
+                      <a:r>
+                        <a:rPr lang="en-US" sz="1400" dirty="0"/>
+                        <a:t>2%</a:t>
+                      </a:r>
+                    </a:p>
+                  </a:txBody>
+                  <a:tcPr anchor="ctr"/>
+                </a:tc>
+                <a:tc>
+                  <a:txBody>
+                    <a:bodyPr/>
+                    <a:lstStyle/>
+                    <a:p>
+                      <a:pPr algn="ctr"/>
+                      <a:r>
+                        <a:rPr lang="en-US" sz="1400" dirty="0"/>
+                        <a:t>2%</a:t>
+                      </a:r>
+                    </a:p>
+                  </a:txBody>
+                  <a:tcPr anchor="ctr"/>
+                </a:tc>
+                <a:extLst>
+                  <a:ext uri="{0D108BD9-81ED-4DB2-BD59-A6C34878D82A}">
+                    <a16:rowId xmlns:a16="http://schemas.microsoft.com/office/drawing/2014/main" val="897694916"/>
+                  </a:ext>
+                </a:extLst>
+              </a:tr>
+              <a:tr h="370840">
+                <a:tc>
+                  <a:txBody>
+                    <a:bodyPr/>
+                    <a:lstStyle/>
+                    <a:p>
+                      <a:r>
+                        <a:rPr lang="en-US" sz="1200" dirty="0"/>
+                        <a:t>Fixed Income</a:t>
+                      </a:r>
+                    </a:p>
+                  </a:txBody>
+                  <a:tcPr anchor="ctr"/>
+                </a:tc>
+                <a:tc>
+                  <a:txBody>
+                    <a:bodyPr/>
+                    <a:lstStyle/>
+                    <a:p>
+                      <a:endParaRPr lang="en-US" sz="1400" dirty="0"/>
+                    </a:p>
+                  </a:txBody>
+                  <a:tcPr anchor="ctr"/>
+                </a:tc>
+                <a:tc>
+                  <a:txBody>
+                    <a:bodyPr/>
+                    <a:lstStyle/>
+                    <a:p>
+                      <a:pPr algn="ctr"/>
+                      <a:r>
+                        <a:rPr lang="en-US" sz="1400" dirty="0"/>
+                        <a:t>98%</a:t>
+                      </a:r>
+                    </a:p>
+                  </a:txBody>
+                  <a:tcPr anchor="ctr"/>
+                </a:tc>
+                <a:tc>
+                  <a:txBody>
+                    <a:bodyPr/>
+                    <a:lstStyle/>
+                    <a:p>
+                      <a:pPr algn="ctr"/>
+                      <a:r>
+                        <a:rPr lang="en-US" sz="1400" dirty="0"/>
+                        <a:t>78%</a:t>
+                      </a:r>
+                    </a:p>
+                  </a:txBody>
+                  <a:tcPr anchor="ctr"/>
+                </a:tc>
+                <a:tc>
+                  <a:txBody>
+                    <a:bodyPr/>
+                    <a:lstStyle/>
+                    <a:p>
+                      <a:pPr algn="ctr"/>
+                      <a:r>
+                        <a:rPr lang="en-US" sz="1400" dirty="0"/>
+                        <a:t>58%</a:t>
+                      </a:r>
+                    </a:p>
+                  </a:txBody>
+                  <a:tcPr anchor="ctr"/>
+                </a:tc>
+                <a:tc>
+                  <a:txBody>
+                    <a:bodyPr/>
+                    <a:lstStyle/>
+                    <a:p>
+                      <a:pPr algn="ctr"/>
+                      <a:r>
+                        <a:rPr lang="en-US" sz="1400" dirty="0"/>
+                        <a:t>38%</a:t>
+                      </a:r>
+                    </a:p>
+                  </a:txBody>
+                  <a:tcPr anchor="ctr"/>
+                </a:tc>
+                <a:tc>
+                  <a:txBody>
+                    <a:bodyPr/>
+                    <a:lstStyle/>
+                    <a:p>
+                      <a:pPr algn="ctr"/>
+                      <a:r>
+                        <a:rPr lang="en-US" sz="1400" dirty="0"/>
+                        <a:t>18%</a:t>
+                      </a:r>
+                    </a:p>
+                  </a:txBody>
+                  <a:tcPr anchor="ctr"/>
+                </a:tc>
+                <a:tc>
+                  <a:txBody>
+                    <a:bodyPr/>
+                    <a:lstStyle/>
+                    <a:p>
+                      <a:pPr algn="ctr"/>
+                      <a:r>
+                        <a:rPr lang="en-US" sz="1400" dirty="0"/>
+                        <a:t>NA</a:t>
+                      </a:r>
+                    </a:p>
+                  </a:txBody>
+                  <a:tcPr anchor="ctr"/>
+                </a:tc>
+                <a:extLst>
+                  <a:ext uri="{0D108BD9-81ED-4DB2-BD59-A6C34878D82A}">
+                    <a16:rowId xmlns:a16="http://schemas.microsoft.com/office/drawing/2014/main" val="4004479858"/>
+                  </a:ext>
+                </a:extLst>
+              </a:tr>
+              <a:tr h="370840">
+                <a:tc>
+                  <a:txBody>
+                    <a:bodyPr/>
+                    <a:lstStyle/>
+                    <a:p>
+                      <a:r>
+                        <a:rPr lang="en-US" sz="1200" dirty="0"/>
+                        <a:t>Equity: Large Cap</a:t>
+                      </a:r>
+                    </a:p>
+                  </a:txBody>
+                  <a:tcPr anchor="ctr"/>
+                </a:tc>
+                <a:tc>
+                  <a:txBody>
+                    <a:bodyPr/>
+                    <a:lstStyle/>
+                    <a:p>
+                      <a:endParaRPr lang="en-US" sz="1400" dirty="0"/>
+                    </a:p>
+                  </a:txBody>
+                  <a:tcPr anchor="ctr"/>
+                </a:tc>
+                <a:tc>
+                  <a:txBody>
+                    <a:bodyPr/>
+                    <a:lstStyle/>
+                    <a:p>
+                      <a:pPr algn="ctr"/>
+                      <a:r>
+                        <a:rPr lang="en-US" sz="1400" dirty="0"/>
+                        <a:t>NA</a:t>
+                      </a:r>
+                    </a:p>
+                  </a:txBody>
+                  <a:tcPr anchor="ctr"/>
+                </a:tc>
+                <a:tc>
+                  <a:txBody>
+                    <a:bodyPr/>
+                    <a:lstStyle/>
+                    <a:p>
+                      <a:pPr algn="ctr"/>
+                      <a:r>
+                        <a:rPr lang="en-US" sz="1400" dirty="0"/>
+                        <a:t>12%</a:t>
+                      </a:r>
+                    </a:p>
+                  </a:txBody>
+                  <a:tcPr anchor="ctr"/>
+                </a:tc>
+                <a:tc>
+                  <a:txBody>
+                    <a:bodyPr/>
+                    <a:lstStyle/>
+                    <a:p>
+                      <a:pPr algn="ctr"/>
+                      <a:r>
+                        <a:rPr lang="en-US" sz="1400" dirty="0"/>
+                        <a:t>18%</a:t>
+                      </a:r>
+                    </a:p>
+                  </a:txBody>
+                  <a:tcPr anchor="ctr"/>
+                </a:tc>
+                <a:tc>
+                  <a:txBody>
+                    <a:bodyPr/>
+                    <a:lstStyle/>
+                    <a:p>
+                      <a:pPr algn="ctr"/>
+                      <a:r>
+                        <a:rPr lang="en-US" sz="1400" dirty="0"/>
+                        <a:t>24%</a:t>
+                      </a:r>
+                    </a:p>
+                  </a:txBody>
+                  <a:tcPr anchor="ctr"/>
+                </a:tc>
+                <a:tc>
+                  <a:txBody>
+                    <a:bodyPr/>
+                    <a:lstStyle/>
+                    <a:p>
+                      <a:pPr algn="ctr"/>
+                      <a:r>
+                        <a:rPr lang="en-US" sz="1400" dirty="0"/>
+                        <a:t>32%</a:t>
+                      </a:r>
+                    </a:p>
+                  </a:txBody>
+                  <a:tcPr anchor="ctr"/>
+                </a:tc>
+                <a:tc>
+                  <a:txBody>
+                    <a:bodyPr/>
+                    <a:lstStyle/>
+                    <a:p>
+                      <a:pPr algn="ctr"/>
+                      <a:r>
+                        <a:rPr lang="en-US" sz="1400" dirty="0"/>
+                        <a:t>38%</a:t>
+                      </a:r>
+                    </a:p>
+                  </a:txBody>
+                  <a:tcPr anchor="ctr"/>
+                </a:tc>
+                <a:extLst>
+                  <a:ext uri="{0D108BD9-81ED-4DB2-BD59-A6C34878D82A}">
+                    <a16:rowId xmlns:a16="http://schemas.microsoft.com/office/drawing/2014/main" val="1716399603"/>
+                  </a:ext>
+                </a:extLst>
+              </a:tr>
+              <a:tr h="370840">
+                <a:tc>
+                  <a:txBody>
+                    <a:bodyPr/>
+                    <a:lstStyle/>
+                    <a:p>
+                      <a:r>
+                        <a:rPr lang="en-US" sz="1200" dirty="0"/>
+                        <a:t>Equity: Mid Cap</a:t>
+                      </a:r>
+                    </a:p>
+                  </a:txBody>
+                  <a:tcPr anchor="ctr"/>
+                </a:tc>
+                <a:tc>
+                  <a:txBody>
+                    <a:bodyPr/>
+                    <a:lstStyle/>
+                    <a:p>
+                      <a:endParaRPr lang="en-US" sz="1400" dirty="0"/>
+                    </a:p>
+                  </a:txBody>
+                  <a:tcPr anchor="ctr"/>
+                </a:tc>
+                <a:tc>
+                  <a:txBody>
+                    <a:bodyPr/>
+                    <a:lstStyle/>
+                    <a:p>
+                      <a:pPr algn="ctr"/>
+                      <a:r>
+                        <a:rPr lang="en-US" sz="1400" dirty="0"/>
+                        <a:t>NA</a:t>
+                      </a:r>
+                    </a:p>
+                  </a:txBody>
+                  <a:tcPr anchor="ctr"/>
+                </a:tc>
+                <a:tc>
+                  <a:txBody>
+                    <a:bodyPr/>
+                    <a:lstStyle/>
+                    <a:p>
+                      <a:pPr algn="ctr"/>
+                      <a:r>
+                        <a:rPr lang="en-US" sz="1400" dirty="0"/>
+                        <a:t>NA</a:t>
+                      </a:r>
+                    </a:p>
+                  </a:txBody>
+                  <a:tcPr anchor="ctr"/>
+                </a:tc>
+                <a:tc>
+                  <a:txBody>
+                    <a:bodyPr/>
+                    <a:lstStyle/>
+                    <a:p>
+                      <a:pPr algn="ctr"/>
+                      <a:r>
+                        <a:rPr lang="en-US" sz="1400" dirty="0"/>
+                        <a:t>6%</a:t>
+                      </a:r>
+                    </a:p>
+                  </a:txBody>
+                  <a:tcPr anchor="ctr"/>
+                </a:tc>
+                <a:tc>
+                  <a:txBody>
+                    <a:bodyPr/>
+                    <a:lstStyle/>
+                    <a:p>
+                      <a:pPr algn="ctr"/>
+                      <a:r>
+                        <a:rPr lang="en-US" sz="1400" dirty="0"/>
+                        <a:t>9%</a:t>
+                      </a:r>
+                    </a:p>
+                  </a:txBody>
+                  <a:tcPr anchor="ctr"/>
+                </a:tc>
+                <a:tc>
+                  <a:txBody>
+                    <a:bodyPr/>
+                    <a:lstStyle/>
+                    <a:p>
+                      <a:pPr algn="ctr"/>
+                      <a:r>
+                        <a:rPr lang="en-US" sz="1400" dirty="0"/>
+                        <a:t>10%</a:t>
+                      </a:r>
+                    </a:p>
+                  </a:txBody>
+                  <a:tcPr anchor="ctr"/>
+                </a:tc>
+                <a:tc>
+                  <a:txBody>
+                    <a:bodyPr/>
+                    <a:lstStyle/>
+                    <a:p>
+                      <a:pPr algn="ctr"/>
+                      <a:r>
+                        <a:rPr lang="en-US" sz="1400" dirty="0"/>
+                        <a:t>13%</a:t>
+                      </a:r>
+                    </a:p>
+                  </a:txBody>
+                  <a:tcPr anchor="ctr"/>
+                </a:tc>
+                <a:extLst>
+                  <a:ext uri="{0D108BD9-81ED-4DB2-BD59-A6C34878D82A}">
+                    <a16:rowId xmlns:a16="http://schemas.microsoft.com/office/drawing/2014/main" val="3463530189"/>
+                  </a:ext>
+                </a:extLst>
+              </a:tr>
+              <a:tr h="370840">
+                <a:tc>
+                  <a:txBody>
+                    <a:bodyPr/>
+                    <a:lstStyle/>
+                    <a:p>
+                      <a:r>
+                        <a:rPr lang="en-US" sz="1200" dirty="0"/>
+                        <a:t>Equity: Small Cap</a:t>
+                      </a:r>
+                    </a:p>
+                  </a:txBody>
+                  <a:tcPr anchor="ctr"/>
+                </a:tc>
+                <a:tc>
+                  <a:txBody>
+                    <a:bodyPr/>
+                    <a:lstStyle/>
+                    <a:p>
+                      <a:endParaRPr lang="en-US" sz="1400" dirty="0"/>
+                    </a:p>
+                  </a:txBody>
+                  <a:tcPr anchor="ctr"/>
+                </a:tc>
+                <a:tc>
+                  <a:txBody>
+                    <a:bodyPr/>
+                    <a:lstStyle/>
+                    <a:p>
+                      <a:pPr algn="ctr"/>
+                      <a:r>
+                        <a:rPr lang="en-US" sz="1400" dirty="0"/>
+                        <a:t>NA</a:t>
+                      </a:r>
+                    </a:p>
+                  </a:txBody>
+                  <a:tcPr anchor="ctr"/>
+                </a:tc>
+                <a:tc>
+                  <a:txBody>
+                    <a:bodyPr/>
+                    <a:lstStyle/>
+                    <a:p>
+                      <a:pPr algn="ctr"/>
+                      <a:r>
+                        <a:rPr lang="en-US" sz="1400" dirty="0"/>
+                        <a:t>NA</a:t>
+                      </a:r>
+                    </a:p>
+                  </a:txBody>
+                  <a:tcPr anchor="ctr"/>
+                </a:tc>
+                <a:tc>
+                  <a:txBody>
+                    <a:bodyPr/>
+                    <a:lstStyle/>
+                    <a:p>
+                      <a:pPr algn="ctr"/>
+                      <a:r>
+                        <a:rPr lang="en-US" sz="1400" dirty="0"/>
+                        <a:t>NA</a:t>
+                      </a:r>
+                    </a:p>
+                  </a:txBody>
+                  <a:tcPr anchor="ctr"/>
+                </a:tc>
+                <a:tc>
+                  <a:txBody>
+                    <a:bodyPr/>
+                    <a:lstStyle/>
+                    <a:p>
+                      <a:pPr algn="ctr"/>
+                      <a:r>
+                        <a:rPr lang="en-US" sz="1400" dirty="0"/>
+                        <a:t>3%</a:t>
+                      </a:r>
+                    </a:p>
+                  </a:txBody>
+                  <a:tcPr anchor="ctr"/>
+                </a:tc>
+                <a:tc>
+                  <a:txBody>
+                    <a:bodyPr/>
+                    <a:lstStyle/>
+                    <a:p>
+                      <a:pPr algn="ctr"/>
+                      <a:r>
+                        <a:rPr lang="en-US" sz="1400" dirty="0"/>
+                        <a:t>6%</a:t>
+                      </a:r>
+                    </a:p>
+                  </a:txBody>
+                  <a:tcPr anchor="ctr"/>
+                </a:tc>
+                <a:tc>
+                  <a:txBody>
+                    <a:bodyPr/>
+                    <a:lstStyle/>
+                    <a:p>
+                      <a:pPr algn="ctr"/>
+                      <a:r>
+                        <a:rPr lang="en-US" sz="1400" dirty="0"/>
+                        <a:t>7%</a:t>
+                      </a:r>
+                    </a:p>
+                  </a:txBody>
+                  <a:tcPr anchor="ctr"/>
+                </a:tc>
+                <a:extLst>
+                  <a:ext uri="{0D108BD9-81ED-4DB2-BD59-A6C34878D82A}">
+                    <a16:rowId xmlns:a16="http://schemas.microsoft.com/office/drawing/2014/main" val="3290545000"/>
+                  </a:ext>
+                </a:extLst>
+              </a:tr>
+              <a:tr h="370840">
+                <a:tc>
+                  <a:txBody>
+                    <a:bodyPr/>
+                    <a:lstStyle/>
+                    <a:p>
+                      <a:r>
+                        <a:rPr lang="en-US" sz="1200" dirty="0"/>
+                        <a:t>Equity: Intl</a:t>
+                      </a:r>
+                    </a:p>
+                  </a:txBody>
+                  <a:tcPr anchor="ctr"/>
+                </a:tc>
+                <a:tc>
+                  <a:txBody>
+                    <a:bodyPr/>
+                    <a:lstStyle/>
+                    <a:p>
+                      <a:endParaRPr lang="en-US" sz="1400" dirty="0"/>
+                    </a:p>
+                  </a:txBody>
+                  <a:tcPr anchor="ctr"/>
+                </a:tc>
+                <a:tc>
+                  <a:txBody>
+                    <a:bodyPr/>
+                    <a:lstStyle/>
+                    <a:p>
+                      <a:pPr algn="ctr"/>
+                      <a:r>
+                        <a:rPr lang="en-US" sz="1400" dirty="0"/>
+                        <a:t>NA</a:t>
+                      </a:r>
+                    </a:p>
+                  </a:txBody>
+                  <a:tcPr anchor="ctr"/>
+                </a:tc>
+                <a:tc>
+                  <a:txBody>
+                    <a:bodyPr/>
+                    <a:lstStyle/>
+                    <a:p>
+                      <a:pPr algn="ctr"/>
+                      <a:r>
+                        <a:rPr lang="en-US" sz="1400" dirty="0"/>
+                        <a:t>8%</a:t>
+                      </a:r>
+                    </a:p>
+                  </a:txBody>
+                  <a:tcPr anchor="ctr"/>
+                </a:tc>
+                <a:tc>
+                  <a:txBody>
+                    <a:bodyPr/>
+                    <a:lstStyle/>
+                    <a:p>
+                      <a:pPr algn="ctr"/>
+                      <a:r>
+                        <a:rPr lang="en-US" sz="1400" dirty="0"/>
+                        <a:t>16%</a:t>
+                      </a:r>
+                    </a:p>
+                  </a:txBody>
+                  <a:tcPr anchor="ctr"/>
+                </a:tc>
+                <a:tc>
+                  <a:txBody>
+                    <a:bodyPr/>
+                    <a:lstStyle/>
+                    <a:p>
+                      <a:pPr algn="ctr"/>
+                      <a:r>
+                        <a:rPr lang="en-US" sz="1400" dirty="0"/>
+                        <a:t>20%</a:t>
+                      </a:r>
+                    </a:p>
+                  </a:txBody>
+                  <a:tcPr anchor="ctr"/>
+                </a:tc>
+                <a:tc>
+                  <a:txBody>
+                    <a:bodyPr/>
+                    <a:lstStyle/>
+                    <a:p>
+                      <a:pPr algn="ctr"/>
+                      <a:r>
+                        <a:rPr lang="en-US" sz="1400" dirty="0"/>
+                        <a:t>26%</a:t>
+                      </a:r>
+                    </a:p>
+                  </a:txBody>
+                  <a:tcPr anchor="ctr"/>
+                </a:tc>
+                <a:tc>
+                  <a:txBody>
+                    <a:bodyPr/>
+                    <a:lstStyle/>
+                    <a:p>
+                      <a:pPr algn="ctr"/>
+                      <a:r>
+                        <a:rPr lang="en-US" sz="1400" dirty="0"/>
+                        <a:t>33%</a:t>
+                      </a:r>
+                    </a:p>
+                  </a:txBody>
+                  <a:tcPr anchor="ctr"/>
+                </a:tc>
+                <a:extLst>
+                  <a:ext uri="{0D108BD9-81ED-4DB2-BD59-A6C34878D82A}">
+                    <a16:rowId xmlns:a16="http://schemas.microsoft.com/office/drawing/2014/main" val="2187623495"/>
+                  </a:ext>
+                </a:extLst>
+              </a:tr>
+              <a:tr h="370840">
+                <a:tc>
+                  <a:txBody>
+                    <a:bodyPr/>
+                    <a:lstStyle/>
+                    <a:p>
+                      <a:r>
+                        <a:rPr lang="en-US" sz="1200" dirty="0"/>
+                        <a:t>Equity: Emerging Mkts</a:t>
+                      </a:r>
+                    </a:p>
+                  </a:txBody>
+                  <a:tcPr anchor="ctr"/>
+                </a:tc>
+                <a:tc>
+                  <a:txBody>
+                    <a:bodyPr/>
+                    <a:lstStyle/>
+                    <a:p>
+                      <a:endParaRPr lang="en-US" sz="1400" dirty="0"/>
+                    </a:p>
+                  </a:txBody>
+                  <a:tcPr anchor="ctr"/>
+                </a:tc>
+                <a:tc>
+                  <a:txBody>
+                    <a:bodyPr/>
+                    <a:lstStyle/>
+                    <a:p>
+                      <a:pPr algn="ctr"/>
+                      <a:r>
+                        <a:rPr lang="en-US" sz="1400" dirty="0"/>
+                        <a:t>NA</a:t>
+                      </a:r>
+                    </a:p>
+                  </a:txBody>
+                  <a:tcPr anchor="ctr"/>
+                </a:tc>
+                <a:tc>
+                  <a:txBody>
+                    <a:bodyPr/>
+                    <a:lstStyle/>
+                    <a:p>
+                      <a:pPr algn="ctr"/>
+                      <a:r>
+                        <a:rPr lang="en-US" sz="1400" dirty="0"/>
+                        <a:t>NA</a:t>
+                      </a:r>
+                    </a:p>
+                  </a:txBody>
+                  <a:tcPr anchor="ctr"/>
+                </a:tc>
+                <a:tc>
+                  <a:txBody>
+                    <a:bodyPr/>
+                    <a:lstStyle/>
+                    <a:p>
+                      <a:pPr algn="ctr"/>
+                      <a:r>
+                        <a:rPr lang="en-US" sz="1400" dirty="0"/>
+                        <a:t>NA</a:t>
+                      </a:r>
+                    </a:p>
+                  </a:txBody>
+                  <a:tcPr anchor="ctr"/>
+                </a:tc>
+                <a:tc>
+                  <a:txBody>
+                    <a:bodyPr/>
+                    <a:lstStyle/>
+                    <a:p>
+                      <a:pPr algn="ctr"/>
+                      <a:r>
+                        <a:rPr lang="en-US" sz="1400" dirty="0"/>
+                        <a:t>4%</a:t>
+                      </a:r>
+                    </a:p>
+                  </a:txBody>
+                  <a:tcPr anchor="ctr"/>
+                </a:tc>
+                <a:tc>
+                  <a:txBody>
+                    <a:bodyPr/>
+                    <a:lstStyle/>
+                    <a:p>
+                      <a:pPr algn="ctr"/>
+                      <a:r>
+                        <a:rPr lang="en-US" sz="1400" dirty="0"/>
+                        <a:t>6%</a:t>
+                      </a:r>
+                    </a:p>
+                  </a:txBody>
+                  <a:tcPr anchor="ctr"/>
+                </a:tc>
+                <a:tc>
+                  <a:txBody>
+                    <a:bodyPr/>
+                    <a:lstStyle/>
+                    <a:p>
+                      <a:pPr algn="ctr"/>
+                      <a:r>
+                        <a:rPr lang="en-US" sz="1400" dirty="0"/>
+                        <a:t>7%</a:t>
+                      </a:r>
+                    </a:p>
+                  </a:txBody>
+                  <a:tcPr anchor="ctr"/>
+                </a:tc>
+                <a:extLst>
+                  <a:ext uri="{0D108BD9-81ED-4DB2-BD59-A6C34878D82A}">
+                    <a16:rowId xmlns:a16="http://schemas.microsoft.com/office/drawing/2014/main" val="3890309346"/>
+                  </a:ext>
+                </a:extLst>
+              </a:tr>
+            </a:tbl>
+          </a:graphicData>
+        </a:graphic>
+      </p:graphicFrame>
     </p:spTree>
     <p:extLst>
       <p:ext uri="{BB962C8B-B14F-4D97-AF65-F5344CB8AC3E}">
-        <p14:creationId xmlns:p14="http://schemas.microsoft.com/office/powerpoint/2010/main" val="3366491455"/>
+        <p14:creationId xmlns:p14="http://schemas.microsoft.com/office/powerpoint/2010/main" val="3778619092"/>
       </p:ext>
     </p:extLst>
   </p:cSld>
@@ -28366,7 +29610,7 @@
           <a:p>
             <a:r>
               <a:rPr lang="en-US" dirty="0"/>
-              <a:t>Comparing 4 portfolios</a:t>
+              <a:t>Risk SCORES</a:t>
             </a:r>
           </a:p>
         </p:txBody>
@@ -28451,7 +29695,40 @@
           <a:bodyPr/>
           <a:lstStyle/>
           <a:p>
-            <a:endParaRPr lang="en-US"/>
+            <a:pPr marL="0" indent="0">
+              <a:buNone/>
+            </a:pPr>
+            <a:r>
+              <a:rPr lang="en-US" dirty="0"/>
+              <a:t>The app calculates basic risk scores based on percentage of annual income being invested, disposable income and an </a:t>
+            </a:r>
+            <a:r>
+              <a:rPr lang="en-US" dirty="0">
+                <a:highlight>
+                  <a:srgbClr val="FFFF00"/>
+                </a:highlight>
+              </a:rPr>
+              <a:t>investment ratio</a:t>
+            </a:r>
+            <a:r>
+              <a:rPr lang="en-US" dirty="0"/>
+              <a:t>.</a:t>
+            </a:r>
+          </a:p>
+          <a:p>
+            <a:pPr marL="0" indent="0">
+              <a:buNone/>
+            </a:pPr>
+            <a:endParaRPr lang="en-US" dirty="0"/>
+          </a:p>
+          <a:p>
+            <a:pPr marL="0" indent="0">
+              <a:buNone/>
+            </a:pPr>
+            <a:r>
+              <a:rPr lang="en-US" dirty="0"/>
+              <a:t>Need explanation  </a:t>
+            </a:r>
           </a:p>
         </p:txBody>
       </p:sp>
@@ -28460,7 +29737,7 @@
           <p:cNvPr id="6" name="Picture 5">
             <a:extLst>
               <a:ext uri="{FF2B5EF4-FFF2-40B4-BE49-F238E27FC236}">
-                <a16:creationId xmlns:a16="http://schemas.microsoft.com/office/drawing/2014/main" id="{66543059-C99F-43C8-85CE-096FD64E727F}"/>
+                <a16:creationId xmlns:a16="http://schemas.microsoft.com/office/drawing/2014/main" id="{38173E07-8BB9-43CE-B1BB-F68C4742EE04}"/>
               </a:ext>
             </a:extLst>
           </p:cNvPr>
@@ -28488,7 +29765,7 @@
     </p:spTree>
     <p:extLst>
       <p:ext uri="{BB962C8B-B14F-4D97-AF65-F5344CB8AC3E}">
-        <p14:creationId xmlns:p14="http://schemas.microsoft.com/office/powerpoint/2010/main" val="3236458125"/>
+        <p14:creationId xmlns:p14="http://schemas.microsoft.com/office/powerpoint/2010/main" val="3366491455"/>
       </p:ext>
     </p:extLst>
   </p:cSld>
@@ -28538,7 +29815,7 @@
           <a:p>
             <a:r>
               <a:rPr lang="en-US" dirty="0"/>
-              <a:t>Sample Data</a:t>
+              <a:t>Comparing portfolios</a:t>
             </a:r>
           </a:p>
         </p:txBody>
@@ -28632,7 +29909,7 @@
           <p:cNvPr id="6" name="Picture 5">
             <a:extLst>
               <a:ext uri="{FF2B5EF4-FFF2-40B4-BE49-F238E27FC236}">
-                <a16:creationId xmlns:a16="http://schemas.microsoft.com/office/drawing/2014/main" id="{D753ADF3-3991-497D-BFFF-B814207A6099}"/>
+                <a16:creationId xmlns:a16="http://schemas.microsoft.com/office/drawing/2014/main" id="{66543059-C99F-43C8-85CE-096FD64E727F}"/>
               </a:ext>
             </a:extLst>
           </p:cNvPr>
@@ -28660,7 +29937,7 @@
     </p:spTree>
     <p:extLst>
       <p:ext uri="{BB962C8B-B14F-4D97-AF65-F5344CB8AC3E}">
-        <p14:creationId xmlns:p14="http://schemas.microsoft.com/office/powerpoint/2010/main" val="3305955585"/>
+        <p14:creationId xmlns:p14="http://schemas.microsoft.com/office/powerpoint/2010/main" val="3236458125"/>
       </p:ext>
     </p:extLst>
   </p:cSld>
@@ -29462,6 +30739,15 @@
 </file>
 
 <file path=customXml/item1.xml><?xml version="1.0" encoding="utf-8"?>
+<?mso-contentType ?>
+<FormTemplates xmlns="http://schemas.microsoft.com/sharepoint/v3/contenttype/forms">
+  <Display>DocumentLibraryForm</Display>
+  <Edit>DocumentLibraryForm</Edit>
+  <New>DocumentLibraryForm</New>
+</FormTemplates>
+</file>
+
+<file path=customXml/item2.xml><?xml version="1.0" encoding="utf-8"?>
 <ct:contentTypeSchema xmlns:ct="http://schemas.microsoft.com/office/2006/metadata/contentType" xmlns:ma="http://schemas.microsoft.com/office/2006/metadata/properties/metaAttributes" ct:_="" ma:_="" ma:contentTypeName="Document" ma:contentTypeID="0x01010079F111ED35F8CC479449609E8A0923A6" ma:contentTypeVersion="11" ma:contentTypeDescription="Create a new document." ma:contentTypeScope="" ma:versionID="96291512c1ee715ab617f4c07df79fc1">
   <xsd:schema xmlns:xsd="http://www.w3.org/2001/XMLSchema" xmlns:xs="http://www.w3.org/2001/XMLSchema" xmlns:p="http://schemas.microsoft.com/office/2006/metadata/properties" xmlns:ns2="71af3243-3dd4-4a8d-8c0d-dd76da1f02a5" xmlns:ns3="16c05727-aa75-4e4a-9b5f-8a80a1165891" targetNamespace="http://schemas.microsoft.com/office/2006/metadata/properties" ma:root="true" ma:fieldsID="8256c27c40ca5c40ce1cf6c44f0205df" ns2:_="" ns3:_="">
     <xsd:import namespace="71af3243-3dd4-4a8d-8c0d-dd76da1f02a5"/>
@@ -29672,15 +30958,6 @@
 </ct:contentTypeSchema>
 </file>
 
-<file path=customXml/item2.xml><?xml version="1.0" encoding="utf-8"?>
-<?mso-contentType ?>
-<FormTemplates xmlns="http://schemas.microsoft.com/sharepoint/v3/contenttype/forms">
-  <Display>DocumentLibraryForm</Display>
-  <Edit>DocumentLibraryForm</Edit>
-  <New>DocumentLibraryForm</New>
-</FormTemplates>
-</file>
-
 <file path=customXml/item3.xml><?xml version="1.0" encoding="utf-8"?>
 <p:properties xmlns:p="http://schemas.microsoft.com/office/2006/metadata/properties" xmlns:xsi="http://www.w3.org/2001/XMLSchema-instance" xmlns:pc="http://schemas.microsoft.com/office/infopath/2007/PartnerControls">
   <documentManagement>
@@ -29690,6 +30967,14 @@
 </file>
 
 <file path=customXml/itemProps1.xml><?xml version="1.0" encoding="utf-8"?>
+<ds:datastoreItem xmlns:ds="http://schemas.openxmlformats.org/officeDocument/2006/customXml" ds:itemID="{D27BEDAB-01B4-4BD0-9390-31AD9280078C}">
+  <ds:schemaRefs>
+    <ds:schemaRef ds:uri="http://schemas.microsoft.com/sharepoint/v3/contenttype/forms"/>
+  </ds:schemaRefs>
+</ds:datastoreItem>
+</file>
+
+<file path=customXml/itemProps2.xml><?xml version="1.0" encoding="utf-8"?>
 <ds:datastoreItem xmlns:ds="http://schemas.openxmlformats.org/officeDocument/2006/customXml" ds:itemID="{6AD934DA-6EDB-4DB8-AE5C-9399A13698D6}">
   <ds:schemaRefs>
     <ds:schemaRef ds:uri="http://schemas.microsoft.com/office/2006/metadata/contentType"/>
@@ -29708,14 +30993,6 @@
 </ds:datastoreItem>
 </file>
 
-<file path=customXml/itemProps2.xml><?xml version="1.0" encoding="utf-8"?>
-<ds:datastoreItem xmlns:ds="http://schemas.openxmlformats.org/officeDocument/2006/customXml" ds:itemID="{D27BEDAB-01B4-4BD0-9390-31AD9280078C}">
-  <ds:schemaRefs>
-    <ds:schemaRef ds:uri="http://schemas.microsoft.com/sharepoint/v3/contenttype/forms"/>
-  </ds:schemaRefs>
-</ds:datastoreItem>
-</file>
-
 <file path=customXml/itemProps3.xml><?xml version="1.0" encoding="utf-8"?>
 <ds:datastoreItem xmlns:ds="http://schemas.openxmlformats.org/officeDocument/2006/customXml" ds:itemID="{9B19B998-C0F0-415C-AF4D-F10DCCD30A25}">
   <ds:schemaRefs>

</xml_diff>